<commit_message>
js file for async presentation
</commit_message>
<xml_diff>
--- a/Osztott rendszerek, párhuzamos programozás.pptx
+++ b/Osztott rendszerek, párhuzamos programozás.pptx
@@ -4,9 +4,15 @@
   <p:sldMasterIdLst>
     <p:sldMasterId id="2147483648" r:id="rId1"/>
   </p:sldMasterIdLst>
+  <p:notesMasterIdLst>
+    <p:notesMasterId r:id="rId7"/>
+  </p:notesMasterIdLst>
   <p:sldIdLst>
     <p:sldId id="256" r:id="rId2"/>
     <p:sldId id="257" r:id="rId3"/>
+    <p:sldId id="258" r:id="rId4"/>
+    <p:sldId id="259" r:id="rId5"/>
+    <p:sldId id="260" r:id="rId6"/>
   </p:sldIdLst>
   <p:sldSz cx="12192000" cy="6858000"/>
   <p:notesSz cx="6858000" cy="9144000"/>
@@ -105,7 +111,698 @@
       </a:defRPr>
     </a:lvl9pPr>
   </p:defaultTextStyle>
+  <p:extLst>
+    <p:ext uri="{EFAFB233-063F-42B5-8137-9DF3F51BA10A}">
+      <p15:sldGuideLst xmlns:p15="http://schemas.microsoft.com/office/powerpoint/2012/main"/>
+    </p:ext>
+  </p:extLst>
 </p:presentation>
+</file>
+
+<file path=ppt/commentAuthors.xml><?xml version="1.0" encoding="utf-8"?>
+<p:cmAuthorLst xmlns:a="http://schemas.openxmlformats.org/drawingml/2006/main" xmlns:r="http://schemas.openxmlformats.org/officeDocument/2006/relationships" xmlns:p="http://schemas.openxmlformats.org/presentationml/2006/main">
+  <p:cmAuthor id="1" name="Balint" initials="B" lastIdx="1" clrIdx="0">
+    <p:extLst>
+      <p:ext uri="{19B8F6BF-5375-455C-9EA6-DF929625EA0E}">
+        <p15:presenceInfo xmlns:p15="http://schemas.microsoft.com/office/powerpoint/2012/main" userId="Balint" providerId="None"/>
+      </p:ext>
+    </p:extLst>
+  </p:cmAuthor>
+</p:cmAuthorLst>
+</file>
+
+<file path=ppt/notesMasters/notesMaster1.xml><?xml version="1.0" encoding="utf-8"?>
+<p:notesMaster xmlns:a="http://schemas.openxmlformats.org/drawingml/2006/main" xmlns:r="http://schemas.openxmlformats.org/officeDocument/2006/relationships" xmlns:p="http://schemas.openxmlformats.org/presentationml/2006/main">
+  <p:cSld>
+    <p:bg>
+      <p:bgRef idx="1001">
+        <a:schemeClr val="bg1"/>
+      </p:bgRef>
+    </p:bg>
+    <p:spTree>
+      <p:nvGrpSpPr>
+        <p:cNvPr id="1" name=""/>
+        <p:cNvGrpSpPr/>
+        <p:nvPr/>
+      </p:nvGrpSpPr>
+      <p:grpSpPr>
+        <a:xfrm>
+          <a:off x="0" y="0"/>
+          <a:ext cx="0" cy="0"/>
+          <a:chOff x="0" y="0"/>
+          <a:chExt cx="0" cy="0"/>
+        </a:xfrm>
+      </p:grpSpPr>
+      <p:sp>
+        <p:nvSpPr>
+          <p:cNvPr id="2" name="Élőfej helye 1"/>
+          <p:cNvSpPr>
+            <a:spLocks noGrp="1"/>
+          </p:cNvSpPr>
+          <p:nvPr>
+            <p:ph type="hdr" sz="quarter"/>
+          </p:nvPr>
+        </p:nvSpPr>
+        <p:spPr>
+          <a:xfrm>
+            <a:off x="0" y="0"/>
+            <a:ext cx="2971800" cy="458788"/>
+          </a:xfrm>
+          <a:prstGeom prst="rect">
+            <a:avLst/>
+          </a:prstGeom>
+        </p:spPr>
+        <p:txBody>
+          <a:bodyPr vert="horz" lIns="91440" tIns="45720" rIns="91440" bIns="45720" rtlCol="0"/>
+          <a:lstStyle>
+            <a:lvl1pPr algn="l">
+              <a:defRPr sz="1200"/>
+            </a:lvl1pPr>
+          </a:lstStyle>
+          <a:p>
+            <a:endParaRPr lang="hu-HU"/>
+          </a:p>
+        </p:txBody>
+      </p:sp>
+      <p:sp>
+        <p:nvSpPr>
+          <p:cNvPr id="3" name="Dátum helye 2"/>
+          <p:cNvSpPr>
+            <a:spLocks noGrp="1"/>
+          </p:cNvSpPr>
+          <p:nvPr>
+            <p:ph type="dt" idx="1"/>
+          </p:nvPr>
+        </p:nvSpPr>
+        <p:spPr>
+          <a:xfrm>
+            <a:off x="3884613" y="0"/>
+            <a:ext cx="2971800" cy="458788"/>
+          </a:xfrm>
+          <a:prstGeom prst="rect">
+            <a:avLst/>
+          </a:prstGeom>
+        </p:spPr>
+        <p:txBody>
+          <a:bodyPr vert="horz" lIns="91440" tIns="45720" rIns="91440" bIns="45720" rtlCol="0"/>
+          <a:lstStyle>
+            <a:lvl1pPr algn="r">
+              <a:defRPr sz="1200"/>
+            </a:lvl1pPr>
+          </a:lstStyle>
+          <a:p>
+            <a:fld id="{81E79A26-81C4-4025-92C3-532DA6E0B8B9}" type="datetimeFigureOut">
+              <a:rPr lang="hu-HU" smtClean="0"/>
+              <a:t>2021. 10. 02.</a:t>
+            </a:fld>
+            <a:endParaRPr lang="hu-HU"/>
+          </a:p>
+        </p:txBody>
+      </p:sp>
+      <p:sp>
+        <p:nvSpPr>
+          <p:cNvPr id="4" name="Diakép helye 3"/>
+          <p:cNvSpPr>
+            <a:spLocks noGrp="1" noRot="1" noChangeAspect="1"/>
+          </p:cNvSpPr>
+          <p:nvPr>
+            <p:ph type="sldImg" idx="2"/>
+          </p:nvPr>
+        </p:nvSpPr>
+        <p:spPr>
+          <a:xfrm>
+            <a:off x="685800" y="1143000"/>
+            <a:ext cx="5486400" cy="3086100"/>
+          </a:xfrm>
+          <a:prstGeom prst="rect">
+            <a:avLst/>
+          </a:prstGeom>
+          <a:noFill/>
+          <a:ln w="12700">
+            <a:solidFill>
+              <a:prstClr val="black"/>
+            </a:solidFill>
+          </a:ln>
+        </p:spPr>
+        <p:txBody>
+          <a:bodyPr vert="horz" lIns="91440" tIns="45720" rIns="91440" bIns="45720" rtlCol="0" anchor="ctr"/>
+          <a:lstStyle/>
+          <a:p>
+            <a:endParaRPr lang="hu-HU"/>
+          </a:p>
+        </p:txBody>
+      </p:sp>
+      <p:sp>
+        <p:nvSpPr>
+          <p:cNvPr id="5" name="Jegyzetek helye 4"/>
+          <p:cNvSpPr>
+            <a:spLocks noGrp="1"/>
+          </p:cNvSpPr>
+          <p:nvPr>
+            <p:ph type="body" sz="quarter" idx="3"/>
+          </p:nvPr>
+        </p:nvSpPr>
+        <p:spPr>
+          <a:xfrm>
+            <a:off x="685800" y="4400550"/>
+            <a:ext cx="5486400" cy="3600450"/>
+          </a:xfrm>
+          <a:prstGeom prst="rect">
+            <a:avLst/>
+          </a:prstGeom>
+        </p:spPr>
+        <p:txBody>
+          <a:bodyPr vert="horz" lIns="91440" tIns="45720" rIns="91440" bIns="45720" rtlCol="0"/>
+          <a:lstStyle/>
+          <a:p>
+            <a:pPr lvl="0"/>
+            <a:r>
+              <a:rPr lang="hu-HU"/>
+              <a:t>Mintaszöveg szerkesztése</a:t>
+            </a:r>
+          </a:p>
+          <a:p>
+            <a:pPr lvl="1"/>
+            <a:r>
+              <a:rPr lang="hu-HU"/>
+              <a:t>Második szint</a:t>
+            </a:r>
+          </a:p>
+          <a:p>
+            <a:pPr lvl="2"/>
+            <a:r>
+              <a:rPr lang="hu-HU"/>
+              <a:t>Harmadik szint</a:t>
+            </a:r>
+          </a:p>
+          <a:p>
+            <a:pPr lvl="3"/>
+            <a:r>
+              <a:rPr lang="hu-HU"/>
+              <a:t>Negyedik szint</a:t>
+            </a:r>
+          </a:p>
+          <a:p>
+            <a:pPr lvl="4"/>
+            <a:r>
+              <a:rPr lang="hu-HU"/>
+              <a:t>Ötödik szint</a:t>
+            </a:r>
+          </a:p>
+        </p:txBody>
+      </p:sp>
+      <p:sp>
+        <p:nvSpPr>
+          <p:cNvPr id="6" name="Élőláb helye 5"/>
+          <p:cNvSpPr>
+            <a:spLocks noGrp="1"/>
+          </p:cNvSpPr>
+          <p:nvPr>
+            <p:ph type="ftr" sz="quarter" idx="4"/>
+          </p:nvPr>
+        </p:nvSpPr>
+        <p:spPr>
+          <a:xfrm>
+            <a:off x="0" y="8685213"/>
+            <a:ext cx="2971800" cy="458787"/>
+          </a:xfrm>
+          <a:prstGeom prst="rect">
+            <a:avLst/>
+          </a:prstGeom>
+        </p:spPr>
+        <p:txBody>
+          <a:bodyPr vert="horz" lIns="91440" tIns="45720" rIns="91440" bIns="45720" rtlCol="0" anchor="b"/>
+          <a:lstStyle>
+            <a:lvl1pPr algn="l">
+              <a:defRPr sz="1200"/>
+            </a:lvl1pPr>
+          </a:lstStyle>
+          <a:p>
+            <a:endParaRPr lang="hu-HU"/>
+          </a:p>
+        </p:txBody>
+      </p:sp>
+      <p:sp>
+        <p:nvSpPr>
+          <p:cNvPr id="7" name="Dia számának helye 6"/>
+          <p:cNvSpPr>
+            <a:spLocks noGrp="1"/>
+          </p:cNvSpPr>
+          <p:nvPr>
+            <p:ph type="sldNum" sz="quarter" idx="5"/>
+          </p:nvPr>
+        </p:nvSpPr>
+        <p:spPr>
+          <a:xfrm>
+            <a:off x="3884613" y="8685213"/>
+            <a:ext cx="2971800" cy="458787"/>
+          </a:xfrm>
+          <a:prstGeom prst="rect">
+            <a:avLst/>
+          </a:prstGeom>
+        </p:spPr>
+        <p:txBody>
+          <a:bodyPr vert="horz" lIns="91440" tIns="45720" rIns="91440" bIns="45720" rtlCol="0" anchor="b"/>
+          <a:lstStyle>
+            <a:lvl1pPr algn="r">
+              <a:defRPr sz="1200"/>
+            </a:lvl1pPr>
+          </a:lstStyle>
+          <a:p>
+            <a:fld id="{674FF4E3-1DEA-4DBB-AF74-DDA85AC22194}" type="slidenum">
+              <a:rPr lang="hu-HU" smtClean="0"/>
+              <a:t>‹#›</a:t>
+            </a:fld>
+            <a:endParaRPr lang="hu-HU"/>
+          </a:p>
+        </p:txBody>
+      </p:sp>
+    </p:spTree>
+    <p:extLst>
+      <p:ext uri="{BB962C8B-B14F-4D97-AF65-F5344CB8AC3E}">
+        <p14:creationId xmlns:p14="http://schemas.microsoft.com/office/powerpoint/2010/main" val="574507801"/>
+      </p:ext>
+    </p:extLst>
+  </p:cSld>
+  <p:clrMap bg1="lt1" tx1="dk1" bg2="lt2" tx2="dk2" accent1="accent1" accent2="accent2" accent3="accent3" accent4="accent4" accent5="accent5" accent6="accent6" hlink="hlink" folHlink="folHlink"/>
+  <p:notesStyle>
+    <a:lvl1pPr marL="0" algn="l" defTabSz="914400" rtl="0" eaLnBrk="1" latinLnBrk="0" hangingPunct="1">
+      <a:defRPr sz="1200" kern="1200">
+        <a:solidFill>
+          <a:schemeClr val="tx1"/>
+        </a:solidFill>
+        <a:latin typeface="+mn-lt"/>
+        <a:ea typeface="+mn-ea"/>
+        <a:cs typeface="+mn-cs"/>
+      </a:defRPr>
+    </a:lvl1pPr>
+    <a:lvl2pPr marL="457200" algn="l" defTabSz="914400" rtl="0" eaLnBrk="1" latinLnBrk="0" hangingPunct="1">
+      <a:defRPr sz="1200" kern="1200">
+        <a:solidFill>
+          <a:schemeClr val="tx1"/>
+        </a:solidFill>
+        <a:latin typeface="+mn-lt"/>
+        <a:ea typeface="+mn-ea"/>
+        <a:cs typeface="+mn-cs"/>
+      </a:defRPr>
+    </a:lvl2pPr>
+    <a:lvl3pPr marL="914400" algn="l" defTabSz="914400" rtl="0" eaLnBrk="1" latinLnBrk="0" hangingPunct="1">
+      <a:defRPr sz="1200" kern="1200">
+        <a:solidFill>
+          <a:schemeClr val="tx1"/>
+        </a:solidFill>
+        <a:latin typeface="+mn-lt"/>
+        <a:ea typeface="+mn-ea"/>
+        <a:cs typeface="+mn-cs"/>
+      </a:defRPr>
+    </a:lvl3pPr>
+    <a:lvl4pPr marL="1371600" algn="l" defTabSz="914400" rtl="0" eaLnBrk="1" latinLnBrk="0" hangingPunct="1">
+      <a:defRPr sz="1200" kern="1200">
+        <a:solidFill>
+          <a:schemeClr val="tx1"/>
+        </a:solidFill>
+        <a:latin typeface="+mn-lt"/>
+        <a:ea typeface="+mn-ea"/>
+        <a:cs typeface="+mn-cs"/>
+      </a:defRPr>
+    </a:lvl4pPr>
+    <a:lvl5pPr marL="1828800" algn="l" defTabSz="914400" rtl="0" eaLnBrk="1" latinLnBrk="0" hangingPunct="1">
+      <a:defRPr sz="1200" kern="1200">
+        <a:solidFill>
+          <a:schemeClr val="tx1"/>
+        </a:solidFill>
+        <a:latin typeface="+mn-lt"/>
+        <a:ea typeface="+mn-ea"/>
+        <a:cs typeface="+mn-cs"/>
+      </a:defRPr>
+    </a:lvl5pPr>
+    <a:lvl6pPr marL="2286000" algn="l" defTabSz="914400" rtl="0" eaLnBrk="1" latinLnBrk="0" hangingPunct="1">
+      <a:defRPr sz="1200" kern="1200">
+        <a:solidFill>
+          <a:schemeClr val="tx1"/>
+        </a:solidFill>
+        <a:latin typeface="+mn-lt"/>
+        <a:ea typeface="+mn-ea"/>
+        <a:cs typeface="+mn-cs"/>
+      </a:defRPr>
+    </a:lvl6pPr>
+    <a:lvl7pPr marL="2743200" algn="l" defTabSz="914400" rtl="0" eaLnBrk="1" latinLnBrk="0" hangingPunct="1">
+      <a:defRPr sz="1200" kern="1200">
+        <a:solidFill>
+          <a:schemeClr val="tx1"/>
+        </a:solidFill>
+        <a:latin typeface="+mn-lt"/>
+        <a:ea typeface="+mn-ea"/>
+        <a:cs typeface="+mn-cs"/>
+      </a:defRPr>
+    </a:lvl7pPr>
+    <a:lvl8pPr marL="3200400" algn="l" defTabSz="914400" rtl="0" eaLnBrk="1" latinLnBrk="0" hangingPunct="1">
+      <a:defRPr sz="1200" kern="1200">
+        <a:solidFill>
+          <a:schemeClr val="tx1"/>
+        </a:solidFill>
+        <a:latin typeface="+mn-lt"/>
+        <a:ea typeface="+mn-ea"/>
+        <a:cs typeface="+mn-cs"/>
+      </a:defRPr>
+    </a:lvl8pPr>
+    <a:lvl9pPr marL="3657600" algn="l" defTabSz="914400" rtl="0" eaLnBrk="1" latinLnBrk="0" hangingPunct="1">
+      <a:defRPr sz="1200" kern="1200">
+        <a:solidFill>
+          <a:schemeClr val="tx1"/>
+        </a:solidFill>
+        <a:latin typeface="+mn-lt"/>
+        <a:ea typeface="+mn-ea"/>
+        <a:cs typeface="+mn-cs"/>
+      </a:defRPr>
+    </a:lvl9pPr>
+  </p:notesStyle>
+</p:notesMaster>
+</file>
+
+<file path=ppt/notesSlides/notesSlide1.xml><?xml version="1.0" encoding="utf-8"?>
+<p:notes xmlns:a="http://schemas.openxmlformats.org/drawingml/2006/main" xmlns:r="http://schemas.openxmlformats.org/officeDocument/2006/relationships" xmlns:p="http://schemas.openxmlformats.org/presentationml/2006/main">
+  <p:cSld>
+    <p:spTree>
+      <p:nvGrpSpPr>
+        <p:cNvPr id="1" name=""/>
+        <p:cNvGrpSpPr/>
+        <p:nvPr/>
+      </p:nvGrpSpPr>
+      <p:grpSpPr>
+        <a:xfrm>
+          <a:off x="0" y="0"/>
+          <a:ext cx="0" cy="0"/>
+          <a:chOff x="0" y="0"/>
+          <a:chExt cx="0" cy="0"/>
+        </a:xfrm>
+      </p:grpSpPr>
+      <p:sp>
+        <p:nvSpPr>
+          <p:cNvPr id="2" name="Diakép helye 1"/>
+          <p:cNvSpPr>
+            <a:spLocks noGrp="1" noRot="1" noChangeAspect="1"/>
+          </p:cNvSpPr>
+          <p:nvPr>
+            <p:ph type="sldImg"/>
+          </p:nvPr>
+        </p:nvSpPr>
+        <p:spPr/>
+      </p:sp>
+      <p:sp>
+        <p:nvSpPr>
+          <p:cNvPr id="3" name="Jegyzetek helye 2"/>
+          <p:cNvSpPr>
+            <a:spLocks noGrp="1"/>
+          </p:cNvSpPr>
+          <p:nvPr>
+            <p:ph type="body" idx="1"/>
+          </p:nvPr>
+        </p:nvSpPr>
+        <p:spPr/>
+        <p:txBody>
+          <a:bodyPr/>
+          <a:lstStyle/>
+          <a:p>
+            <a:r>
+              <a:rPr lang="hu-HU" dirty="0"/>
+              <a:t>A számítástechnikában a folyamat egy számítógépes program példánya, amelyet egy vagy több szál hajt végre. Ez tartalmazza a programkódot és a tevékenységét. Operációs rendszertől függően egy folyamat több végrehajtási szálból állhat, amely utasításokat egyidejűleg hajtják végre.</a:t>
+            </a:r>
+            <a:br>
+              <a:rPr lang="hu-HU" dirty="0"/>
+            </a:br>
+            <a:br>
+              <a:rPr lang="hu-HU" dirty="0"/>
+            </a:br>
+            <a:r>
+              <a:rPr lang="hu-HU" dirty="0"/>
+              <a:t>Míg a számítógépes program passzív utasítások gyűjteménye, addig a folyamat ezen utasítások tényleges végrehajtása.</a:t>
+            </a:r>
+          </a:p>
+        </p:txBody>
+      </p:sp>
+      <p:sp>
+        <p:nvSpPr>
+          <p:cNvPr id="4" name="Dia számának helye 3"/>
+          <p:cNvSpPr>
+            <a:spLocks noGrp="1"/>
+          </p:cNvSpPr>
+          <p:nvPr>
+            <p:ph type="sldNum" sz="quarter" idx="5"/>
+          </p:nvPr>
+        </p:nvSpPr>
+        <p:spPr/>
+        <p:txBody>
+          <a:bodyPr/>
+          <a:lstStyle/>
+          <a:p>
+            <a:fld id="{674FF4E3-1DEA-4DBB-AF74-DDA85AC22194}" type="slidenum">
+              <a:rPr lang="hu-HU" smtClean="0"/>
+              <a:t>3</a:t>
+            </a:fld>
+            <a:endParaRPr lang="hu-HU"/>
+          </a:p>
+        </p:txBody>
+      </p:sp>
+    </p:spTree>
+    <p:extLst>
+      <p:ext uri="{BB962C8B-B14F-4D97-AF65-F5344CB8AC3E}">
+        <p14:creationId xmlns:p14="http://schemas.microsoft.com/office/powerpoint/2010/main" val="481971378"/>
+      </p:ext>
+    </p:extLst>
+  </p:cSld>
+  <p:clrMapOvr>
+    <a:masterClrMapping/>
+  </p:clrMapOvr>
+</p:notes>
+</file>
+
+<file path=ppt/notesSlides/notesSlide2.xml><?xml version="1.0" encoding="utf-8"?>
+<p:notes xmlns:a="http://schemas.openxmlformats.org/drawingml/2006/main" xmlns:r="http://schemas.openxmlformats.org/officeDocument/2006/relationships" xmlns:p="http://schemas.openxmlformats.org/presentationml/2006/main">
+  <p:cSld>
+    <p:spTree>
+      <p:nvGrpSpPr>
+        <p:cNvPr id="1" name=""/>
+        <p:cNvGrpSpPr/>
+        <p:nvPr/>
+      </p:nvGrpSpPr>
+      <p:grpSpPr>
+        <a:xfrm>
+          <a:off x="0" y="0"/>
+          <a:ext cx="0" cy="0"/>
+          <a:chOff x="0" y="0"/>
+          <a:chExt cx="0" cy="0"/>
+        </a:xfrm>
+      </p:grpSpPr>
+      <p:sp>
+        <p:nvSpPr>
+          <p:cNvPr id="2" name="Diakép helye 1"/>
+          <p:cNvSpPr>
+            <a:spLocks noGrp="1" noRot="1" noChangeAspect="1"/>
+          </p:cNvSpPr>
+          <p:nvPr>
+            <p:ph type="sldImg"/>
+          </p:nvPr>
+        </p:nvSpPr>
+        <p:spPr/>
+      </p:sp>
+      <p:sp>
+        <p:nvSpPr>
+          <p:cNvPr id="3" name="Jegyzetek helye 2"/>
+          <p:cNvSpPr>
+            <a:spLocks noGrp="1"/>
+          </p:cNvSpPr>
+          <p:nvPr>
+            <p:ph type="body" idx="1"/>
+          </p:nvPr>
+        </p:nvSpPr>
+        <p:spPr/>
+        <p:txBody>
+          <a:bodyPr/>
+          <a:lstStyle/>
+          <a:p>
+            <a:r>
+              <a:rPr lang="hu-HU" dirty="0"/>
+              <a:t>Egy operációs rendszer rendszermagjának, amely lehetővé teszi a </a:t>
+            </a:r>
+            <a:r>
+              <a:rPr lang="hu-HU" dirty="0" err="1"/>
+              <a:t>többfeladatosságot</a:t>
+            </a:r>
+            <a:r>
+              <a:rPr lang="hu-HU" dirty="0"/>
+              <a:t>, szüksége van arra, hogy a folyamatoknak legyenek bizonyos állapotai. Ezeknek az állapotoknak a nevei nincsenek szabványosítva, de hasonló funkcióval rendelkeznek.</a:t>
+            </a:r>
+            <a:br>
+              <a:rPr lang="hu-HU" dirty="0"/>
+            </a:br>
+            <a:br>
+              <a:rPr lang="hu-HU" dirty="0"/>
+            </a:br>
+            <a:r>
+              <a:rPr lang="hu-HU" dirty="0" err="1"/>
+              <a:t>Created</a:t>
+            </a:r>
+            <a:r>
+              <a:rPr lang="hu-HU" dirty="0"/>
+              <a:t>: Első lépésben a folyamatot „létrehozzuk”, azaz betöltjük a memóriába. Ezután a folyamatütemező hozzárendeli a „</a:t>
+            </a:r>
+            <a:r>
+              <a:rPr lang="hu-HU" dirty="0" err="1"/>
+              <a:t>waiting</a:t>
+            </a:r>
+            <a:r>
+              <a:rPr lang="hu-HU" dirty="0"/>
+              <a:t>” </a:t>
+            </a:r>
+            <a:r>
+              <a:rPr lang="hu-HU" dirty="0" err="1"/>
+              <a:t>állapoot</a:t>
+            </a:r>
+            <a:r>
+              <a:rPr lang="hu-HU" dirty="0"/>
+              <a:t> a folyamathoz.</a:t>
+            </a:r>
+            <a:br>
+              <a:rPr lang="hu-HU" dirty="0"/>
+            </a:br>
+            <a:br>
+              <a:rPr lang="hu-HU" dirty="0"/>
+            </a:br>
+            <a:r>
+              <a:rPr lang="hu-HU" dirty="0" err="1"/>
+              <a:t>Waiting</a:t>
+            </a:r>
+            <a:r>
+              <a:rPr lang="hu-HU" dirty="0"/>
+              <a:t>: </a:t>
+            </a:r>
+            <a:r>
+              <a:rPr lang="hu-HU" dirty="0" err="1"/>
+              <a:t>Amígy</a:t>
+            </a:r>
+            <a:r>
+              <a:rPr lang="hu-HU" dirty="0"/>
+              <a:t> a folyamat „</a:t>
+            </a:r>
+            <a:r>
+              <a:rPr lang="hu-HU" dirty="0" err="1"/>
+              <a:t>waiting</a:t>
+            </a:r>
+            <a:r>
+              <a:rPr lang="hu-HU" dirty="0"/>
+              <a:t>” állapotban van, addig az ütemező elvégzi a kontextusváltást. A kontextusváltás betölti a folyamatot a processzorba és az </a:t>
+            </a:r>
+            <a:r>
+              <a:rPr lang="hu-HU" dirty="0" err="1"/>
+              <a:t>allapototo</a:t>
+            </a:r>
+            <a:r>
+              <a:rPr lang="hu-HU" dirty="0"/>
+              <a:t> „</a:t>
+            </a:r>
+            <a:r>
+              <a:rPr lang="hu-HU" dirty="0" err="1"/>
+              <a:t>running</a:t>
+            </a:r>
+            <a:r>
+              <a:rPr lang="hu-HU" dirty="0"/>
+              <a:t>”-</a:t>
+            </a:r>
+            <a:r>
+              <a:rPr lang="hu-HU" dirty="0" err="1"/>
+              <a:t>ra</a:t>
+            </a:r>
+            <a:r>
+              <a:rPr lang="hu-HU" dirty="0"/>
+              <a:t> állítja.</a:t>
+            </a:r>
+          </a:p>
+          <a:p>
+            <a:endParaRPr lang="hu-HU" dirty="0"/>
+          </a:p>
+          <a:p>
+            <a:r>
+              <a:rPr lang="hu-HU" dirty="0" err="1"/>
+              <a:t>Blocked</a:t>
+            </a:r>
+            <a:r>
+              <a:rPr lang="hu-HU" dirty="0"/>
+              <a:t>: Ebbe az állapotba akkor kerül a folyamat, ha a folyamatnak meg kell várnia egy erőforrást (például várnia kell a felhasználói bemenetre, vagy egy fájl megnyitására), addig blokkolt állapotba kerül.</a:t>
+            </a:r>
+            <a:br>
+              <a:rPr lang="hu-HU" dirty="0"/>
+            </a:br>
+            <a:r>
+              <a:rPr lang="hu-HU" dirty="0"/>
+              <a:t>A folyamat állapota visszaáll a „</a:t>
+            </a:r>
+            <a:r>
+              <a:rPr lang="hu-HU" dirty="0" err="1"/>
+              <a:t>waiting</a:t>
+            </a:r>
+            <a:r>
+              <a:rPr lang="hu-HU" dirty="0"/>
+              <a:t>” állapotra, amint a folyamatnak nem kell tovább várni.</a:t>
+            </a:r>
+          </a:p>
+          <a:p>
+            <a:endParaRPr lang="hu-HU" dirty="0"/>
+          </a:p>
+          <a:p>
+            <a:r>
+              <a:rPr lang="hu-HU" dirty="0" err="1"/>
+              <a:t>Terminated</a:t>
+            </a:r>
+            <a:r>
+              <a:rPr lang="hu-HU" dirty="0"/>
+              <a:t>: Amint a folyamat lefutott, akkor az a folyamat „</a:t>
+            </a:r>
+            <a:r>
+              <a:rPr lang="hu-HU" dirty="0" err="1"/>
+              <a:t>terminated</a:t>
+            </a:r>
+            <a:r>
+              <a:rPr lang="hu-HU" dirty="0"/>
+              <a:t>” állapotba kerül.</a:t>
+            </a:r>
+          </a:p>
+        </p:txBody>
+      </p:sp>
+      <p:sp>
+        <p:nvSpPr>
+          <p:cNvPr id="4" name="Dia számának helye 3"/>
+          <p:cNvSpPr>
+            <a:spLocks noGrp="1"/>
+          </p:cNvSpPr>
+          <p:nvPr>
+            <p:ph type="sldNum" sz="quarter" idx="5"/>
+          </p:nvPr>
+        </p:nvSpPr>
+        <p:spPr/>
+        <p:txBody>
+          <a:bodyPr/>
+          <a:lstStyle/>
+          <a:p>
+            <a:fld id="{674FF4E3-1DEA-4DBB-AF74-DDA85AC22194}" type="slidenum">
+              <a:rPr lang="hu-HU" smtClean="0"/>
+              <a:t>4</a:t>
+            </a:fld>
+            <a:endParaRPr lang="hu-HU"/>
+          </a:p>
+        </p:txBody>
+      </p:sp>
+    </p:spTree>
+    <p:extLst>
+      <p:ext uri="{BB962C8B-B14F-4D97-AF65-F5344CB8AC3E}">
+        <p14:creationId xmlns:p14="http://schemas.microsoft.com/office/powerpoint/2010/main" val="217478851"/>
+      </p:ext>
+    </p:extLst>
+  </p:cSld>
+  <p:clrMapOvr>
+    <a:masterClrMapping/>
+  </p:clrMapOvr>
+</p:notes>
 </file>
 
 <file path=ppt/slideLayouts/slideLayout1.xml><?xml version="1.0" encoding="utf-8"?>
@@ -3440,32 +4137,130 @@
           <a:bodyPr/>
           <a:lstStyle/>
           <a:p>
+            <a:r>
+              <a:rPr lang="hu-HU" dirty="0"/>
+              <a:t>Miről lesz szó a kurzus alatt?</a:t>
+            </a:r>
+          </a:p>
+        </p:txBody>
+      </p:sp>
+      <p:sp>
+        <p:nvSpPr>
+          <p:cNvPr id="3" name="Tartalom helye 2">
+            <a:extLst>
+              <a:ext uri="{FF2B5EF4-FFF2-40B4-BE49-F238E27FC236}">
+                <a16:creationId xmlns:a16="http://schemas.microsoft.com/office/drawing/2014/main" id="{0D146250-FAF4-4A46-94FF-D7C65953C01E}"/>
+              </a:ext>
+            </a:extLst>
+          </p:cNvPr>
+          <p:cNvSpPr>
+            <a:spLocks noGrp="1"/>
+          </p:cNvSpPr>
+          <p:nvPr>
+            <p:ph idx="1"/>
+          </p:nvPr>
+        </p:nvSpPr>
+        <p:spPr/>
+        <p:txBody>
+          <a:bodyPr>
+            <a:normAutofit fontScale="85000" lnSpcReduction="20000"/>
+          </a:bodyPr>
+          <a:lstStyle/>
+          <a:p>
+            <a:r>
+              <a:rPr lang="hu-HU" dirty="0"/>
+              <a:t>Folyamatok </a:t>
+            </a:r>
+          </a:p>
+          <a:p>
+            <a:r>
+              <a:rPr lang="hu-HU" dirty="0"/>
+              <a:t>Szálak</a:t>
+            </a:r>
+          </a:p>
+          <a:p>
+            <a:r>
+              <a:rPr lang="hu-HU" dirty="0" err="1"/>
+              <a:t>Koténerizálás</a:t>
+            </a:r>
             <a:endParaRPr lang="hu-HU" dirty="0"/>
           </a:p>
-        </p:txBody>
-      </p:sp>
-      <p:sp>
-        <p:nvSpPr>
-          <p:cNvPr id="3" name="Tartalom helye 2">
-            <a:extLst>
-              <a:ext uri="{FF2B5EF4-FFF2-40B4-BE49-F238E27FC236}">
-                <a16:creationId xmlns:a16="http://schemas.microsoft.com/office/drawing/2014/main" id="{0D146250-FAF4-4A46-94FF-D7C65953C01E}"/>
-              </a:ext>
-            </a:extLst>
-          </p:cNvPr>
-          <p:cNvSpPr>
-            <a:spLocks noGrp="1"/>
-          </p:cNvSpPr>
-          <p:nvPr>
-            <p:ph idx="1"/>
-          </p:nvPr>
-        </p:nvSpPr>
-        <p:spPr/>
-        <p:txBody>
-          <a:bodyPr/>
-          <a:lstStyle/>
-          <a:p>
-            <a:endParaRPr lang="hu-HU"/>
+          <a:p>
+            <a:r>
+              <a:rPr lang="hu-HU" dirty="0" err="1"/>
+              <a:t>Numa</a:t>
+            </a:r>
+            <a:endParaRPr lang="hu-HU" dirty="0"/>
+          </a:p>
+          <a:p>
+            <a:r>
+              <a:rPr lang="hu-HU" dirty="0"/>
+              <a:t>Tervezési minták</a:t>
+            </a:r>
+          </a:p>
+          <a:p>
+            <a:r>
+              <a:rPr lang="hu-HU" dirty="0" err="1"/>
+              <a:t>Singleton</a:t>
+            </a:r>
+            <a:endParaRPr lang="hu-HU" dirty="0"/>
+          </a:p>
+          <a:p>
+            <a:r>
+              <a:rPr lang="hu-HU" dirty="0" err="1"/>
+              <a:t>Azure</a:t>
+            </a:r>
+            <a:endParaRPr lang="hu-HU" dirty="0"/>
+          </a:p>
+          <a:p>
+            <a:r>
+              <a:rPr lang="hu-HU" dirty="0"/>
+              <a:t>Elosztott rendszerek tervezési mintái és használatuk</a:t>
+            </a:r>
+          </a:p>
+          <a:p>
+            <a:r>
+              <a:rPr lang="hu-HU" dirty="0"/>
+              <a:t>Kommunikáció elosztott rendszerekben</a:t>
+            </a:r>
+          </a:p>
+          <a:p>
+            <a:r>
+              <a:rPr lang="hu-HU" dirty="0"/>
+              <a:t>Monolitikus rendszerek szemben </a:t>
+            </a:r>
+            <a:r>
+              <a:rPr lang="hu-HU" dirty="0" err="1"/>
+              <a:t>mikroszervíz</a:t>
+            </a:r>
+            <a:r>
+              <a:rPr lang="hu-HU" dirty="0"/>
+              <a:t> architektúrával</a:t>
+            </a:r>
+          </a:p>
+          <a:p>
+            <a:r>
+              <a:rPr lang="hu-HU" dirty="0"/>
+              <a:t>Vertikális vagy horizontális skálázás</a:t>
+            </a:r>
+          </a:p>
+          <a:p>
+            <a:endParaRPr lang="hu-HU" dirty="0"/>
+          </a:p>
+          <a:p>
+            <a:endParaRPr lang="hu-HU" dirty="0"/>
+          </a:p>
+          <a:p>
+            <a:endParaRPr lang="hu-HU" dirty="0"/>
+          </a:p>
+          <a:p>
+            <a:endParaRPr lang="hu-HU" dirty="0"/>
+          </a:p>
+          <a:p>
+            <a:endParaRPr lang="hu-HU" dirty="0"/>
+          </a:p>
+          <a:p>
+            <a:endParaRPr lang="hu-HU" dirty="0"/>
           </a:p>
         </p:txBody>
       </p:sp>
@@ -3473,6 +4268,314 @@
     <p:extLst>
       <p:ext uri="{BB962C8B-B14F-4D97-AF65-F5344CB8AC3E}">
         <p14:creationId xmlns:p14="http://schemas.microsoft.com/office/powerpoint/2010/main" val="3904471378"/>
+      </p:ext>
+    </p:extLst>
+  </p:cSld>
+  <p:clrMapOvr>
+    <a:masterClrMapping/>
+  </p:clrMapOvr>
+</p:sld>
+</file>
+
+<file path=ppt/slides/slide3.xml><?xml version="1.0" encoding="utf-8"?>
+<p:sld xmlns:a="http://schemas.openxmlformats.org/drawingml/2006/main" xmlns:r="http://schemas.openxmlformats.org/officeDocument/2006/relationships" xmlns:p="http://schemas.openxmlformats.org/presentationml/2006/main">
+  <p:cSld>
+    <p:spTree>
+      <p:nvGrpSpPr>
+        <p:cNvPr id="1" name=""/>
+        <p:cNvGrpSpPr/>
+        <p:nvPr/>
+      </p:nvGrpSpPr>
+      <p:grpSpPr>
+        <a:xfrm>
+          <a:off x="0" y="0"/>
+          <a:ext cx="0" cy="0"/>
+          <a:chOff x="0" y="0"/>
+          <a:chExt cx="0" cy="0"/>
+        </a:xfrm>
+      </p:grpSpPr>
+      <p:sp>
+        <p:nvSpPr>
+          <p:cNvPr id="2" name="Cím 1">
+            <a:extLst>
+              <a:ext uri="{FF2B5EF4-FFF2-40B4-BE49-F238E27FC236}">
+                <a16:creationId xmlns:a16="http://schemas.microsoft.com/office/drawing/2014/main" id="{C9D5461E-6EAF-40C4-9B97-C1BC365F58DE}"/>
+              </a:ext>
+            </a:extLst>
+          </p:cNvPr>
+          <p:cNvSpPr>
+            <a:spLocks noGrp="1"/>
+          </p:cNvSpPr>
+          <p:nvPr>
+            <p:ph type="title"/>
+          </p:nvPr>
+        </p:nvSpPr>
+        <p:spPr/>
+        <p:txBody>
+          <a:bodyPr/>
+          <a:lstStyle/>
+          <a:p>
+            <a:r>
+              <a:rPr lang="hu-HU" dirty="0"/>
+              <a:t>Folyamatok</a:t>
+            </a:r>
+          </a:p>
+        </p:txBody>
+      </p:sp>
+      <p:sp>
+        <p:nvSpPr>
+          <p:cNvPr id="3" name="Tartalom helye 2">
+            <a:extLst>
+              <a:ext uri="{FF2B5EF4-FFF2-40B4-BE49-F238E27FC236}">
+                <a16:creationId xmlns:a16="http://schemas.microsoft.com/office/drawing/2014/main" id="{66061774-ADB4-4C39-89A1-3CA9CB1DA7C9}"/>
+              </a:ext>
+            </a:extLst>
+          </p:cNvPr>
+          <p:cNvSpPr>
+            <a:spLocks noGrp="1"/>
+          </p:cNvSpPr>
+          <p:nvPr>
+            <p:ph idx="1"/>
+          </p:nvPr>
+        </p:nvSpPr>
+        <p:spPr/>
+        <p:txBody>
+          <a:bodyPr/>
+          <a:lstStyle/>
+          <a:p>
+            <a:r>
+              <a:rPr lang="hu-HU" dirty="0"/>
+              <a:t>Több szál hajtja végre</a:t>
+            </a:r>
+          </a:p>
+          <a:p>
+            <a:r>
+              <a:rPr lang="hu-HU" dirty="0"/>
+              <a:t>Tartalmazza a programkódot és tevékenységét</a:t>
+            </a:r>
+          </a:p>
+          <a:p>
+            <a:r>
+              <a:rPr lang="hu-HU" dirty="0"/>
+              <a:t>Egy folyamatnak több állapota lehet</a:t>
+            </a:r>
+          </a:p>
+        </p:txBody>
+      </p:sp>
+    </p:spTree>
+    <p:extLst>
+      <p:ext uri="{BB962C8B-B14F-4D97-AF65-F5344CB8AC3E}">
+        <p14:creationId xmlns:p14="http://schemas.microsoft.com/office/powerpoint/2010/main" val="1009441983"/>
+      </p:ext>
+    </p:extLst>
+  </p:cSld>
+  <p:clrMapOvr>
+    <a:masterClrMapping/>
+  </p:clrMapOvr>
+</p:sld>
+</file>
+
+<file path=ppt/slides/slide4.xml><?xml version="1.0" encoding="utf-8"?>
+<p:sld xmlns:a="http://schemas.openxmlformats.org/drawingml/2006/main" xmlns:r="http://schemas.openxmlformats.org/officeDocument/2006/relationships" xmlns:p="http://schemas.openxmlformats.org/presentationml/2006/main">
+  <p:cSld>
+    <p:spTree>
+      <p:nvGrpSpPr>
+        <p:cNvPr id="1" name=""/>
+        <p:cNvGrpSpPr/>
+        <p:nvPr/>
+      </p:nvGrpSpPr>
+      <p:grpSpPr>
+        <a:xfrm>
+          <a:off x="0" y="0"/>
+          <a:ext cx="0" cy="0"/>
+          <a:chOff x="0" y="0"/>
+          <a:chExt cx="0" cy="0"/>
+        </a:xfrm>
+      </p:grpSpPr>
+      <p:sp>
+        <p:nvSpPr>
+          <p:cNvPr id="2" name="Cím 1">
+            <a:extLst>
+              <a:ext uri="{FF2B5EF4-FFF2-40B4-BE49-F238E27FC236}">
+                <a16:creationId xmlns:a16="http://schemas.microsoft.com/office/drawing/2014/main" id="{01D1D361-642F-4323-A54A-DAE7C1485FC2}"/>
+              </a:ext>
+            </a:extLst>
+          </p:cNvPr>
+          <p:cNvSpPr>
+            <a:spLocks noGrp="1"/>
+          </p:cNvSpPr>
+          <p:nvPr>
+            <p:ph type="title"/>
+          </p:nvPr>
+        </p:nvSpPr>
+        <p:spPr>
+          <a:xfrm>
+            <a:off x="838199" y="0"/>
+            <a:ext cx="10515600" cy="1325563"/>
+          </a:xfrm>
+        </p:spPr>
+        <p:txBody>
+          <a:bodyPr/>
+          <a:lstStyle/>
+          <a:p>
+            <a:pPr algn="ctr"/>
+            <a:r>
+              <a:rPr lang="hu-HU" dirty="0"/>
+              <a:t>Folyamatállapotok</a:t>
+            </a:r>
+          </a:p>
+        </p:txBody>
+      </p:sp>
+      <p:pic>
+        <p:nvPicPr>
+          <p:cNvPr id="1028" name="Picture 4" descr="https://upload.wikimedia.org/wikipedia/commons/thumb/8/83/Process_states.svg/1024px-Process_states.svg.png">
+            <a:extLst>
+              <a:ext uri="{FF2B5EF4-FFF2-40B4-BE49-F238E27FC236}">
+                <a16:creationId xmlns:a16="http://schemas.microsoft.com/office/drawing/2014/main" id="{FA612C6E-BAFE-4C11-BB63-F088CED5E05A}"/>
+              </a:ext>
+            </a:extLst>
+          </p:cNvPr>
+          <p:cNvPicPr>
+            <a:picLocks noChangeAspect="1" noChangeArrowheads="1"/>
+          </p:cNvPicPr>
+          <p:nvPr/>
+        </p:nvPicPr>
+        <p:blipFill>
+          <a:blip r:embed="rId3">
+            <a:extLst>
+              <a:ext uri="{28A0092B-C50C-407E-A947-70E740481C1C}">
+                <a14:useLocalDpi xmlns:a14="http://schemas.microsoft.com/office/drawing/2010/main" val="0"/>
+              </a:ext>
+            </a:extLst>
+          </a:blip>
+          <a:srcRect/>
+          <a:stretch>
+            <a:fillRect/>
+          </a:stretch>
+        </p:blipFill>
+        <p:spPr bwMode="auto">
+          <a:xfrm>
+            <a:off x="3486150" y="1066800"/>
+            <a:ext cx="5219700" cy="5791200"/>
+          </a:xfrm>
+          <a:prstGeom prst="rect">
+            <a:avLst/>
+          </a:prstGeom>
+          <a:noFill/>
+          <a:extLst>
+            <a:ext uri="{909E8E84-426E-40DD-AFC4-6F175D3DCCD1}">
+              <a14:hiddenFill xmlns:a14="http://schemas.microsoft.com/office/drawing/2010/main">
+                <a:solidFill>
+                  <a:srgbClr val="FFFFFF"/>
+                </a:solidFill>
+              </a14:hiddenFill>
+            </a:ext>
+          </a:extLst>
+        </p:spPr>
+      </p:pic>
+    </p:spTree>
+    <p:extLst>
+      <p:ext uri="{BB962C8B-B14F-4D97-AF65-F5344CB8AC3E}">
+        <p14:creationId xmlns:p14="http://schemas.microsoft.com/office/powerpoint/2010/main" val="577941730"/>
+      </p:ext>
+    </p:extLst>
+  </p:cSld>
+  <p:clrMapOvr>
+    <a:masterClrMapping/>
+  </p:clrMapOvr>
+</p:sld>
+</file>
+
+<file path=ppt/slides/slide5.xml><?xml version="1.0" encoding="utf-8"?>
+<p:sld xmlns:a="http://schemas.openxmlformats.org/drawingml/2006/main" xmlns:r="http://schemas.openxmlformats.org/officeDocument/2006/relationships" xmlns:p="http://schemas.openxmlformats.org/presentationml/2006/main">
+  <p:cSld>
+    <p:spTree>
+      <p:nvGrpSpPr>
+        <p:cNvPr id="1" name=""/>
+        <p:cNvGrpSpPr/>
+        <p:nvPr/>
+      </p:nvGrpSpPr>
+      <p:grpSpPr>
+        <a:xfrm>
+          <a:off x="0" y="0"/>
+          <a:ext cx="0" cy="0"/>
+          <a:chOff x="0" y="0"/>
+          <a:chExt cx="0" cy="0"/>
+        </a:xfrm>
+      </p:grpSpPr>
+      <p:sp>
+        <p:nvSpPr>
+          <p:cNvPr id="2" name="Cím 1">
+            <a:extLst>
+              <a:ext uri="{FF2B5EF4-FFF2-40B4-BE49-F238E27FC236}">
+                <a16:creationId xmlns:a16="http://schemas.microsoft.com/office/drawing/2014/main" id="{EC9BEC7B-56CF-4849-95F5-4B2D0C381343}"/>
+              </a:ext>
+            </a:extLst>
+          </p:cNvPr>
+          <p:cNvSpPr>
+            <a:spLocks noGrp="1"/>
+          </p:cNvSpPr>
+          <p:nvPr>
+            <p:ph type="title"/>
+          </p:nvPr>
+        </p:nvSpPr>
+        <p:spPr/>
+        <p:txBody>
+          <a:bodyPr/>
+          <a:lstStyle/>
+          <a:p>
+            <a:endParaRPr lang="hu-HU"/>
+          </a:p>
+        </p:txBody>
+      </p:sp>
+      <p:sp>
+        <p:nvSpPr>
+          <p:cNvPr id="3" name="Tartalom helye 2">
+            <a:extLst>
+              <a:ext uri="{FF2B5EF4-FFF2-40B4-BE49-F238E27FC236}">
+                <a16:creationId xmlns:a16="http://schemas.microsoft.com/office/drawing/2014/main" id="{31C14EB4-5FA4-4FA0-A1B5-E36D224D01FB}"/>
+              </a:ext>
+            </a:extLst>
+          </p:cNvPr>
+          <p:cNvSpPr>
+            <a:spLocks noGrp="1"/>
+          </p:cNvSpPr>
+          <p:nvPr>
+            <p:ph idx="1"/>
+          </p:nvPr>
+        </p:nvSpPr>
+        <p:spPr/>
+        <p:txBody>
+          <a:bodyPr/>
+          <a:lstStyle/>
+          <a:p>
+            <a:r>
+              <a:rPr lang="en-US" dirty="0"/>
+              <a:t>Chapter 4. Processes, Operating system concepts with Java, Sixth, John Wiley &amp; Sons</a:t>
+            </a:r>
+            <a:endParaRPr lang="hu-HU" dirty="0"/>
+          </a:p>
+          <a:p>
+            <a:r>
+              <a:rPr lang="en-US" dirty="0"/>
+              <a:t>Stallings, William. </a:t>
+            </a:r>
+            <a:r>
+              <a:rPr lang="en-US" i="1" dirty="0"/>
+              <a:t>Operating Systems: internals and design principles</a:t>
+            </a:r>
+            <a:r>
+              <a:rPr lang="en-US" dirty="0"/>
+              <a:t>, 5th, Prentice Hall</a:t>
+            </a:r>
+            <a:endParaRPr lang="hu-HU" dirty="0"/>
+          </a:p>
+        </p:txBody>
+      </p:sp>
+    </p:spTree>
+    <p:extLst>
+      <p:ext uri="{BB962C8B-B14F-4D97-AF65-F5344CB8AC3E}">
+        <p14:creationId xmlns:p14="http://schemas.microsoft.com/office/powerpoint/2010/main" val="1840052443"/>
       </p:ext>
     </p:extLst>
   </p:cSld>
@@ -3775,4 +4878,299 @@
     </a:ext>
   </a:extLst>
 </a:theme>
+</file>
+
+<file path=ppt/theme/theme2.xml><?xml version="1.0" encoding="utf-8"?>
+<a:theme xmlns:a="http://schemas.openxmlformats.org/drawingml/2006/main" name="Office-téma">
+  <a:themeElements>
+    <a:clrScheme name="Office">
+      <a:dk1>
+        <a:sysClr val="windowText" lastClr="000000"/>
+      </a:dk1>
+      <a:lt1>
+        <a:sysClr val="window" lastClr="FFFFFF"/>
+      </a:lt1>
+      <a:dk2>
+        <a:srgbClr val="44546A"/>
+      </a:dk2>
+      <a:lt2>
+        <a:srgbClr val="E7E6E6"/>
+      </a:lt2>
+      <a:accent1>
+        <a:srgbClr val="4472C4"/>
+      </a:accent1>
+      <a:accent2>
+        <a:srgbClr val="ED7D31"/>
+      </a:accent2>
+      <a:accent3>
+        <a:srgbClr val="A5A5A5"/>
+      </a:accent3>
+      <a:accent4>
+        <a:srgbClr val="FFC000"/>
+      </a:accent4>
+      <a:accent5>
+        <a:srgbClr val="5B9BD5"/>
+      </a:accent5>
+      <a:accent6>
+        <a:srgbClr val="70AD47"/>
+      </a:accent6>
+      <a:hlink>
+        <a:srgbClr val="0563C1"/>
+      </a:hlink>
+      <a:folHlink>
+        <a:srgbClr val="954F72"/>
+      </a:folHlink>
+    </a:clrScheme>
+    <a:fontScheme name="Office">
+      <a:majorFont>
+        <a:latin typeface="Calibri Light" panose="020F0302020204030204"/>
+        <a:ea typeface=""/>
+        <a:cs typeface=""/>
+        <a:font script="Jpan" typeface="游ゴシック Light"/>
+        <a:font script="Hang" typeface="맑은 고딕"/>
+        <a:font script="Hans" typeface="等线 Light"/>
+        <a:font script="Hant" typeface="新細明體"/>
+        <a:font script="Arab" typeface="Times New Roman"/>
+        <a:font script="Hebr" typeface="Times New Roman"/>
+        <a:font script="Thai" typeface="Angsana New"/>
+        <a:font script="Ethi" typeface="Nyala"/>
+        <a:font script="Beng" typeface="Vrinda"/>
+        <a:font script="Gujr" typeface="Shruti"/>
+        <a:font script="Khmr" typeface="MoolBoran"/>
+        <a:font script="Knda" typeface="Tunga"/>
+        <a:font script="Guru" typeface="Raavi"/>
+        <a:font script="Cans" typeface="Euphemia"/>
+        <a:font script="Cher" typeface="Plantagenet Cherokee"/>
+        <a:font script="Yiii" typeface="Microsoft Yi Baiti"/>
+        <a:font script="Tibt" typeface="Microsoft Himalaya"/>
+        <a:font script="Thaa" typeface="MV Boli"/>
+        <a:font script="Deva" typeface="Mangal"/>
+        <a:font script="Telu" typeface="Gautami"/>
+        <a:font script="Taml" typeface="Latha"/>
+        <a:font script="Syrc" typeface="Estrangelo Edessa"/>
+        <a:font script="Orya" typeface="Kalinga"/>
+        <a:font script="Mlym" typeface="Kartika"/>
+        <a:font script="Laoo" typeface="DokChampa"/>
+        <a:font script="Sinh" typeface="Iskoola Pota"/>
+        <a:font script="Mong" typeface="Mongolian Baiti"/>
+        <a:font script="Viet" typeface="Times New Roman"/>
+        <a:font script="Uigh" typeface="Microsoft Uighur"/>
+        <a:font script="Geor" typeface="Sylfaen"/>
+        <a:font script="Armn" typeface="Arial"/>
+        <a:font script="Bugi" typeface="Leelawadee UI"/>
+        <a:font script="Bopo" typeface="Microsoft JhengHei"/>
+        <a:font script="Java" typeface="Javanese Text"/>
+        <a:font script="Lisu" typeface="Segoe UI"/>
+        <a:font script="Mymr" typeface="Myanmar Text"/>
+        <a:font script="Nkoo" typeface="Ebrima"/>
+        <a:font script="Olck" typeface="Nirmala UI"/>
+        <a:font script="Osma" typeface="Ebrima"/>
+        <a:font script="Phag" typeface="Phagspa"/>
+        <a:font script="Syrn" typeface="Estrangelo Edessa"/>
+        <a:font script="Syrj" typeface="Estrangelo Edessa"/>
+        <a:font script="Syre" typeface="Estrangelo Edessa"/>
+        <a:font script="Sora" typeface="Nirmala UI"/>
+        <a:font script="Tale" typeface="Microsoft Tai Le"/>
+        <a:font script="Talu" typeface="Microsoft New Tai Lue"/>
+        <a:font script="Tfng" typeface="Ebrima"/>
+      </a:majorFont>
+      <a:minorFont>
+        <a:latin typeface="Calibri" panose="020F0502020204030204"/>
+        <a:ea typeface=""/>
+        <a:cs typeface=""/>
+        <a:font script="Jpan" typeface="游ゴシック"/>
+        <a:font script="Hang" typeface="맑은 고딕"/>
+        <a:font script="Hans" typeface="等线"/>
+        <a:font script="Hant" typeface="新細明體"/>
+        <a:font script="Arab" typeface="Arial"/>
+        <a:font script="Hebr" typeface="Arial"/>
+        <a:font script="Thai" typeface="Cordia New"/>
+        <a:font script="Ethi" typeface="Nyala"/>
+        <a:font script="Beng" typeface="Vrinda"/>
+        <a:font script="Gujr" typeface="Shruti"/>
+        <a:font script="Khmr" typeface="DaunPenh"/>
+        <a:font script="Knda" typeface="Tunga"/>
+        <a:font script="Guru" typeface="Raavi"/>
+        <a:font script="Cans" typeface="Euphemia"/>
+        <a:font script="Cher" typeface="Plantagenet Cherokee"/>
+        <a:font script="Yiii" typeface="Microsoft Yi Baiti"/>
+        <a:font script="Tibt" typeface="Microsoft Himalaya"/>
+        <a:font script="Thaa" typeface="MV Boli"/>
+        <a:font script="Deva" typeface="Mangal"/>
+        <a:font script="Telu" typeface="Gautami"/>
+        <a:font script="Taml" typeface="Latha"/>
+        <a:font script="Syrc" typeface="Estrangelo Edessa"/>
+        <a:font script="Orya" typeface="Kalinga"/>
+        <a:font script="Mlym" typeface="Kartika"/>
+        <a:font script="Laoo" typeface="DokChampa"/>
+        <a:font script="Sinh" typeface="Iskoola Pota"/>
+        <a:font script="Mong" typeface="Mongolian Baiti"/>
+        <a:font script="Viet" typeface="Arial"/>
+        <a:font script="Uigh" typeface="Microsoft Uighur"/>
+        <a:font script="Geor" typeface="Sylfaen"/>
+        <a:font script="Armn" typeface="Arial"/>
+        <a:font script="Bugi" typeface="Leelawadee UI"/>
+        <a:font script="Bopo" typeface="Microsoft JhengHei"/>
+        <a:font script="Java" typeface="Javanese Text"/>
+        <a:font script="Lisu" typeface="Segoe UI"/>
+        <a:font script="Mymr" typeface="Myanmar Text"/>
+        <a:font script="Nkoo" typeface="Ebrima"/>
+        <a:font script="Olck" typeface="Nirmala UI"/>
+        <a:font script="Osma" typeface="Ebrima"/>
+        <a:font script="Phag" typeface="Phagspa"/>
+        <a:font script="Syrn" typeface="Estrangelo Edessa"/>
+        <a:font script="Syrj" typeface="Estrangelo Edessa"/>
+        <a:font script="Syre" typeface="Estrangelo Edessa"/>
+        <a:font script="Sora" typeface="Nirmala UI"/>
+        <a:font script="Tale" typeface="Microsoft Tai Le"/>
+        <a:font script="Talu" typeface="Microsoft New Tai Lue"/>
+        <a:font script="Tfng" typeface="Ebrima"/>
+      </a:minorFont>
+    </a:fontScheme>
+    <a:fmtScheme name="Office">
+      <a:fillStyleLst>
+        <a:solidFill>
+          <a:schemeClr val="phClr"/>
+        </a:solidFill>
+        <a:gradFill rotWithShape="1">
+          <a:gsLst>
+            <a:gs pos="0">
+              <a:schemeClr val="phClr">
+                <a:lumMod val="110000"/>
+                <a:satMod val="105000"/>
+                <a:tint val="67000"/>
+              </a:schemeClr>
+            </a:gs>
+            <a:gs pos="50000">
+              <a:schemeClr val="phClr">
+                <a:lumMod val="105000"/>
+                <a:satMod val="103000"/>
+                <a:tint val="73000"/>
+              </a:schemeClr>
+            </a:gs>
+            <a:gs pos="100000">
+              <a:schemeClr val="phClr">
+                <a:lumMod val="105000"/>
+                <a:satMod val="109000"/>
+                <a:tint val="81000"/>
+              </a:schemeClr>
+            </a:gs>
+          </a:gsLst>
+          <a:lin ang="5400000" scaled="0"/>
+        </a:gradFill>
+        <a:gradFill rotWithShape="1">
+          <a:gsLst>
+            <a:gs pos="0">
+              <a:schemeClr val="phClr">
+                <a:satMod val="103000"/>
+                <a:lumMod val="102000"/>
+                <a:tint val="94000"/>
+              </a:schemeClr>
+            </a:gs>
+            <a:gs pos="50000">
+              <a:schemeClr val="phClr">
+                <a:satMod val="110000"/>
+                <a:lumMod val="100000"/>
+                <a:shade val="100000"/>
+              </a:schemeClr>
+            </a:gs>
+            <a:gs pos="100000">
+              <a:schemeClr val="phClr">
+                <a:lumMod val="99000"/>
+                <a:satMod val="120000"/>
+                <a:shade val="78000"/>
+              </a:schemeClr>
+            </a:gs>
+          </a:gsLst>
+          <a:lin ang="5400000" scaled="0"/>
+        </a:gradFill>
+      </a:fillStyleLst>
+      <a:lnStyleLst>
+        <a:ln w="6350" cap="flat" cmpd="sng" algn="ctr">
+          <a:solidFill>
+            <a:schemeClr val="phClr"/>
+          </a:solidFill>
+          <a:prstDash val="solid"/>
+          <a:miter lim="800000"/>
+        </a:ln>
+        <a:ln w="12700" cap="flat" cmpd="sng" algn="ctr">
+          <a:solidFill>
+            <a:schemeClr val="phClr"/>
+          </a:solidFill>
+          <a:prstDash val="solid"/>
+          <a:miter lim="800000"/>
+        </a:ln>
+        <a:ln w="19050" cap="flat" cmpd="sng" algn="ctr">
+          <a:solidFill>
+            <a:schemeClr val="phClr"/>
+          </a:solidFill>
+          <a:prstDash val="solid"/>
+          <a:miter lim="800000"/>
+        </a:ln>
+      </a:lnStyleLst>
+      <a:effectStyleLst>
+        <a:effectStyle>
+          <a:effectLst/>
+        </a:effectStyle>
+        <a:effectStyle>
+          <a:effectLst/>
+        </a:effectStyle>
+        <a:effectStyle>
+          <a:effectLst>
+            <a:outerShdw blurRad="57150" dist="19050" dir="5400000" algn="ctr" rotWithShape="0">
+              <a:srgbClr val="000000">
+                <a:alpha val="63000"/>
+              </a:srgbClr>
+            </a:outerShdw>
+          </a:effectLst>
+        </a:effectStyle>
+      </a:effectStyleLst>
+      <a:bgFillStyleLst>
+        <a:solidFill>
+          <a:schemeClr val="phClr"/>
+        </a:solidFill>
+        <a:solidFill>
+          <a:schemeClr val="phClr">
+            <a:tint val="95000"/>
+            <a:satMod val="170000"/>
+          </a:schemeClr>
+        </a:solidFill>
+        <a:gradFill rotWithShape="1">
+          <a:gsLst>
+            <a:gs pos="0">
+              <a:schemeClr val="phClr">
+                <a:tint val="93000"/>
+                <a:satMod val="150000"/>
+                <a:shade val="98000"/>
+                <a:lumMod val="102000"/>
+              </a:schemeClr>
+            </a:gs>
+            <a:gs pos="50000">
+              <a:schemeClr val="phClr">
+                <a:tint val="98000"/>
+                <a:satMod val="130000"/>
+                <a:shade val="90000"/>
+                <a:lumMod val="103000"/>
+              </a:schemeClr>
+            </a:gs>
+            <a:gs pos="100000">
+              <a:schemeClr val="phClr">
+                <a:shade val="63000"/>
+                <a:satMod val="120000"/>
+              </a:schemeClr>
+            </a:gs>
+          </a:gsLst>
+          <a:lin ang="5400000" scaled="0"/>
+        </a:gradFill>
+      </a:bgFillStyleLst>
+    </a:fmtScheme>
+  </a:themeElements>
+  <a:objectDefaults/>
+  <a:extraClrSchemeLst/>
+  <a:extLst>
+    <a:ext uri="{05A4C25C-085E-4340-85A3-A5531E510DB2}">
+      <thm15:themeFamily xmlns:thm15="http://schemas.microsoft.com/office/thememl/2012/main" name="Office Theme" id="{62F939B6-93AF-4DB8-9C6B-D6C7DFDC589F}" vid="{4A3C46E8-61CC-4603-A589-7422A47A8E4A}"/>
+    </a:ext>
+  </a:extLst>
+</a:theme>
 </file>
</xml_diff>

<commit_message>
singleton & pptx & docker videó
</commit_message>
<xml_diff>
--- a/Osztott rendszerek, párhuzamos programozás.pptx
+++ b/Osztott rendszerek, párhuzamos programozás.pptx
@@ -5,7 +5,7 @@
     <p:sldMasterId id="2147483648" r:id="rId1"/>
   </p:sldMasterIdLst>
   <p:notesMasterIdLst>
-    <p:notesMasterId r:id="rId27"/>
+    <p:notesMasterId r:id="rId30"/>
   </p:notesMasterIdLst>
   <p:sldIdLst>
     <p:sldId id="256" r:id="rId2"/>
@@ -22,17 +22,20 @@
     <p:sldId id="269" r:id="rId13"/>
     <p:sldId id="268" r:id="rId14"/>
     <p:sldId id="270" r:id="rId15"/>
-    <p:sldId id="271" r:id="rId16"/>
-    <p:sldId id="272" r:id="rId17"/>
-    <p:sldId id="273" r:id="rId18"/>
-    <p:sldId id="274" r:id="rId19"/>
-    <p:sldId id="275" r:id="rId20"/>
-    <p:sldId id="276" r:id="rId21"/>
-    <p:sldId id="277" r:id="rId22"/>
-    <p:sldId id="278" r:id="rId23"/>
-    <p:sldId id="279" r:id="rId24"/>
-    <p:sldId id="280" r:id="rId25"/>
-    <p:sldId id="260" r:id="rId26"/>
+    <p:sldId id="280" r:id="rId16"/>
+    <p:sldId id="281" r:id="rId17"/>
+    <p:sldId id="271" r:id="rId18"/>
+    <p:sldId id="272" r:id="rId19"/>
+    <p:sldId id="273" r:id="rId20"/>
+    <p:sldId id="274" r:id="rId21"/>
+    <p:sldId id="275" r:id="rId22"/>
+    <p:sldId id="276" r:id="rId23"/>
+    <p:sldId id="277" r:id="rId24"/>
+    <p:sldId id="278" r:id="rId25"/>
+    <p:sldId id="279" r:id="rId26"/>
+    <p:sldId id="282" r:id="rId27"/>
+    <p:sldId id="283" r:id="rId28"/>
+    <p:sldId id="260" r:id="rId29"/>
   </p:sldIdLst>
   <p:sldSz cx="12192000" cy="6858000"/>
   <p:notesSz cx="6858000" cy="9144000"/>
@@ -233,7 +236,7 @@
           <a:p>
             <a:fld id="{81E79A26-81C4-4025-92C3-532DA6E0B8B9}" type="datetimeFigureOut">
               <a:rPr lang="hu-HU" smtClean="0"/>
-              <a:t>2021. 10. 26.</a:t>
+              <a:t>2021. 11. 11.</a:t>
             </a:fld>
             <a:endParaRPr lang="hu-HU"/>
           </a:p>
@@ -1522,15 +1525,63 @@
           <a:p>
             <a:r>
               <a:rPr lang="hu-HU" dirty="0"/>
-              <a:t>1: </a:t>
+              <a:t>Gyakori, hogy egy osztályt úgy kell megírni, hogy csak egy példány legyen belőle. </a:t>
+            </a:r>
+          </a:p>
+          <a:p>
+            <a:r>
+              <a:rPr lang="hu-HU" dirty="0"/>
+              <a:t>Ehhez jól kell ismerni az objektumorientált programozás alapelveit.</a:t>
+            </a:r>
+          </a:p>
+          <a:p>
+            <a:r>
+              <a:rPr lang="hu-HU" dirty="0"/>
+              <a:t>Az osztályból példányt a konstruktorával lehet készíteni. </a:t>
+            </a:r>
+          </a:p>
+          <a:p>
+            <a:r>
+              <a:rPr lang="hu-HU" dirty="0"/>
+              <a:t>Ha van publikus konstruktor az osztályban, akkor akárhány példány készíthető belőle, tehát publikus konstruktora nem lehet az egykének. </a:t>
+            </a:r>
+          </a:p>
+          <a:p>
+            <a:r>
+              <a:rPr lang="hu-HU" dirty="0"/>
+              <a:t>De ha nincs konstruktor, akkor nem hozható létre a példány, amin keresztül hívhatnánk a metódusait. </a:t>
+            </a:r>
+          </a:p>
+          <a:p>
+            <a:r>
+              <a:rPr lang="hu-HU" dirty="0"/>
+              <a:t>A megoldást az osztályszintű (statikus) metódusok jelentik.</a:t>
+            </a:r>
+          </a:p>
+          <a:p>
+            <a:r>
+              <a:rPr lang="hu-HU" dirty="0"/>
+              <a:t>Ezeket akkor is lehet hívni, ha nincs példány. </a:t>
+            </a:r>
+          </a:p>
+          <a:p>
+            <a:r>
+              <a:rPr lang="hu-HU" dirty="0"/>
+              <a:t>Az egykének tehát van egy osztályszintű metódusa, ami minden hívójának ugyanazt a példányt adja vissza. </a:t>
+            </a:r>
+          </a:p>
+          <a:p>
+            <a:r>
+              <a:rPr lang="hu-HU" dirty="0"/>
+              <a:t>Természetesen ezt a példányt is létre kell hozni, ehhez privát konstruktort kell készíteni, amit a </a:t>
             </a:r>
             <a:r>
               <a:rPr lang="hu-HU" dirty="0" err="1"/>
-              <a:t>pl</a:t>
-            </a:r>
-            <a:r>
-              <a:rPr lang="hu-HU" dirty="0"/>
-              <a:t> nyomtató megosztás, az erőforrás adat is lehet</a:t>
+              <a:t>getInstance</a:t>
+            </a:r>
+            <a:r>
+              <a:rPr lang="hu-HU" dirty="0"/>
+              <a:t> az egyke osztály tagjaként meghívhat</a:t>
             </a:r>
           </a:p>
           <a:p>
@@ -1539,20 +1590,37 @@
           <a:p>
             <a:r>
               <a:rPr lang="hu-HU" dirty="0"/>
-              <a:t>Átlátszóság: a felhasználó csak az adatot kapja, nem kell tudni az üzemeltetőről, a rendszer „elfedi” mi van alatta</a:t>
-            </a:r>
-          </a:p>
-          <a:p>
-            <a:endParaRPr lang="hu-HU" dirty="0"/>
-          </a:p>
-          <a:p>
-            <a:r>
-              <a:rPr lang="hu-HU" dirty="0"/>
-              <a:t>Skálázhatóság: különböző terhelésekre tudjon reagálni</a:t>
-            </a:r>
-          </a:p>
-          <a:p>
-            <a:endParaRPr lang="hu-HU" dirty="0"/>
+              <a:t>Felhasználása:</a:t>
+            </a:r>
+            <a:br>
+              <a:rPr lang="hu-HU" dirty="0"/>
+            </a:br>
+            <a:r>
+              <a:rPr lang="hu-HU" dirty="0"/>
+              <a:t>Akkor érdemes használni, ha több példány egyidejű létezése a rendszer rendellenes működését vagy összeomlását okozhatja.</a:t>
+            </a:r>
+          </a:p>
+          <a:p>
+            <a:r>
+              <a:rPr lang="hu-HU" dirty="0"/>
+              <a:t>A globális változókkal szemben gyakran az egykéket részesítik előnyben, mivel nem szennyezik a névteret szükségtelen változókkal, és lehetővé teszik a </a:t>
+            </a:r>
+            <a:r>
+              <a:rPr lang="hu-HU" dirty="0" err="1"/>
+              <a:t>lazyload</a:t>
+            </a:r>
+            <a:r>
+              <a:rPr lang="hu-HU" dirty="0"/>
+              <a:t>-ot és </a:t>
+            </a:r>
+            <a:r>
+              <a:rPr lang="hu-HU" dirty="0" err="1"/>
+              <a:t>inicializációt</a:t>
+            </a:r>
+            <a:r>
+              <a:rPr lang="hu-HU" dirty="0"/>
+              <a:t>, míg a globális változók mindig fogyasztanak erőforrásokat.</a:t>
+            </a:r>
           </a:p>
         </p:txBody>
       </p:sp>
@@ -1573,7 +1641,7 @@
           <a:p>
             <a:fld id="{674FF4E3-1DEA-4DBB-AF74-DDA85AC22194}" type="slidenum">
               <a:rPr lang="hu-HU" smtClean="0"/>
-              <a:t>16</a:t>
+              <a:t>15</a:t>
             </a:fld>
             <a:endParaRPr lang="hu-HU"/>
           </a:p>
@@ -1582,7 +1650,7 @@
     </p:spTree>
     <p:extLst>
       <p:ext uri="{BB962C8B-B14F-4D97-AF65-F5344CB8AC3E}">
-        <p14:creationId xmlns:p14="http://schemas.microsoft.com/office/powerpoint/2010/main" val="4287810101"/>
+        <p14:creationId xmlns:p14="http://schemas.microsoft.com/office/powerpoint/2010/main" val="4258266632"/>
       </p:ext>
     </p:extLst>
   </p:cSld>
@@ -1638,109 +1706,27 @@
           <a:p>
             <a:r>
               <a:rPr lang="hu-HU" dirty="0"/>
-              <a:t>hozzáférési (</a:t>
+              <a:t>A lusta betöltés egy létrehozási programtervezési minta. Lényege, hogy elhalasztják az objektum létrehozását akkorra, amikor tényleg szükség van rá.</a:t>
+            </a:r>
+          </a:p>
+          <a:p>
+            <a:r>
+              <a:rPr lang="hu-HU" dirty="0"/>
+              <a:t>Megfelelő használat esetén javíthatja a program válaszadási képességét és növelheti sebességét.</a:t>
+            </a:r>
+          </a:p>
+          <a:p>
+            <a:r>
+              <a:rPr lang="hu-HU" dirty="0"/>
+              <a:t>Akkor lehet vele sokat nyerni, ha nem feltétlenül van szükség arra, hogy </a:t>
             </a:r>
             <a:r>
               <a:rPr lang="hu-HU" dirty="0" err="1"/>
-              <a:t>access</a:t>
-            </a:r>
-            <a:r>
-              <a:rPr lang="hu-HU" dirty="0"/>
-              <a:t>): adatok tárolási módjának, belső reprezentációjának elfedése (pl. ’/’</a:t>
-            </a:r>
-          </a:p>
-          <a:p>
-            <a:r>
-              <a:rPr lang="hu-HU" dirty="0"/>
-              <a:t>vagy ’\’ – közös interfész)</a:t>
-            </a:r>
-          </a:p>
-          <a:p>
-            <a:endParaRPr lang="hu-HU" dirty="0"/>
-          </a:p>
-          <a:p>
-            <a:r>
-              <a:rPr lang="hu-HU" dirty="0"/>
-              <a:t>hely (</a:t>
-            </a:r>
-            <a:r>
-              <a:rPr lang="hu-HU" dirty="0" err="1"/>
-              <a:t>location</a:t>
-            </a:r>
-            <a:r>
-              <a:rPr lang="hu-HU" dirty="0"/>
-              <a:t>): fizikai hely elfedése, pl. globális névvel (pl. URL)</a:t>
-            </a:r>
-          </a:p>
-          <a:p>
-            <a:endParaRPr lang="hu-HU" dirty="0"/>
-          </a:p>
-          <a:p>
-            <a:r>
-              <a:rPr lang="hu-HU" dirty="0"/>
-              <a:t>mozgatási (</a:t>
-            </a:r>
-            <a:r>
-              <a:rPr lang="hu-HU" dirty="0" err="1"/>
-              <a:t>migration</a:t>
-            </a:r>
-            <a:r>
-              <a:rPr lang="hu-HU" dirty="0"/>
-              <a:t>): szerver fizikai mozgatása ne érintse a felhasználót</a:t>
-            </a:r>
-          </a:p>
-          <a:p>
-            <a:endParaRPr lang="hu-HU" dirty="0"/>
-          </a:p>
-          <a:p>
-            <a:r>
-              <a:rPr lang="hu-HU" dirty="0" err="1"/>
-              <a:t>relokációs</a:t>
-            </a:r>
-            <a:r>
-              <a:rPr lang="hu-HU" dirty="0"/>
-              <a:t>: a kliens ne tudjon arról, hogy másik kiszolgálóra váltott a rendszer (pl. váltás egyik</a:t>
-            </a:r>
-          </a:p>
-          <a:p>
-            <a:r>
-              <a:rPr lang="hu-HU" dirty="0"/>
-              <a:t>adatbázisról a másikra, vagy wifi esetén séta -&gt; másik router)</a:t>
-            </a:r>
-          </a:p>
-          <a:p>
-            <a:endParaRPr lang="hu-HU" dirty="0"/>
-          </a:p>
-          <a:p>
-            <a:r>
-              <a:rPr lang="hu-HU" dirty="0"/>
-              <a:t>replikációs: felhasználó ne lássa, hogy melyik </a:t>
-            </a:r>
-            <a:r>
-              <a:rPr lang="hu-HU" dirty="0" err="1"/>
-              <a:t>replikátumból</a:t>
-            </a:r>
-            <a:r>
-              <a:rPr lang="hu-HU" dirty="0"/>
-              <a:t> kapja az adatot</a:t>
-            </a:r>
-          </a:p>
-          <a:p>
-            <a:endParaRPr lang="hu-HU" dirty="0"/>
-          </a:p>
-          <a:p>
-            <a:r>
-              <a:rPr lang="hu-HU" dirty="0"/>
-              <a:t>konkurencia: az alkalmazásnak nem kell tudnia, hogy más is használja az erőforrást</a:t>
-            </a:r>
-          </a:p>
-          <a:p>
-            <a:endParaRPr lang="hu-HU" dirty="0"/>
-          </a:p>
-          <a:p>
-            <a:r>
-              <a:rPr lang="hu-HU" dirty="0"/>
-              <a:t>hibatűrés: felhasználó ne lássa a hibát</a:t>
+              <a:t>inicializálódjon</a:t>
+            </a:r>
+            <a:r>
+              <a:rPr lang="hu-HU" dirty="0"/>
+              <a:t> egy objektum, aminek inicializálása költséges.</a:t>
             </a:r>
           </a:p>
         </p:txBody>
@@ -1762,7 +1748,7 @@
           <a:p>
             <a:fld id="{674FF4E3-1DEA-4DBB-AF74-DDA85AC22194}" type="slidenum">
               <a:rPr lang="hu-HU" smtClean="0"/>
-              <a:t>17</a:t>
+              <a:t>16</a:t>
             </a:fld>
             <a:endParaRPr lang="hu-HU"/>
           </a:p>
@@ -1771,7 +1757,7 @@
     </p:spTree>
     <p:extLst>
       <p:ext uri="{BB962C8B-B14F-4D97-AF65-F5344CB8AC3E}">
-        <p14:creationId xmlns:p14="http://schemas.microsoft.com/office/powerpoint/2010/main" val="4176186853"/>
+        <p14:creationId xmlns:p14="http://schemas.microsoft.com/office/powerpoint/2010/main" val="2522102575"/>
       </p:ext>
     </p:extLst>
   </p:cSld>
@@ -1827,19 +1813,15 @@
           <a:p>
             <a:r>
               <a:rPr lang="hu-HU" dirty="0"/>
-              <a:t>milyen nyelv? Java? C? -&gt; kell egy jól definiált interfész. ez különböző erősségű lehet:</a:t>
-            </a:r>
-          </a:p>
-          <a:p>
-            <a:r>
-              <a:rPr lang="hu-HU" dirty="0"/>
-              <a:t>    o teljesség: megmondjuk, mit kell csinálni</a:t>
-            </a:r>
-          </a:p>
-          <a:p>
-            <a:r>
-              <a:rPr lang="hu-HU" dirty="0"/>
-              <a:t>    o semlegesség: nem mondjuk meg, hogyan csinálja</a:t>
+              <a:t>1: </a:t>
+            </a:r>
+            <a:r>
+              <a:rPr lang="hu-HU" dirty="0" err="1"/>
+              <a:t>pl</a:t>
+            </a:r>
+            <a:r>
+              <a:rPr lang="hu-HU" dirty="0"/>
+              <a:t> nyomtató megosztás, az erőforrás adat is lehet</a:t>
             </a:r>
           </a:p>
           <a:p>
@@ -1848,7 +1830,7 @@
           <a:p>
             <a:r>
               <a:rPr lang="hu-HU" dirty="0"/>
-              <a:t>hordozhatóság: egyik gépről a másikra (UNIX -&gt; Windows)</a:t>
+              <a:t>Átlátszóság: a felhasználó csak az adatot kapja, nem kell tudni az üzemeltetőről, a rendszer „elfedi” mi van alatta</a:t>
             </a:r>
           </a:p>
           <a:p>
@@ -1857,7 +1839,7 @@
           <a:p>
             <a:r>
               <a:rPr lang="hu-HU" dirty="0"/>
-              <a:t>műveletek közötti átjárhatóság (pl. komponens csere után is működik a rendszer)</a:t>
+              <a:t>Skálázhatóság: különböző terhelésekre tudjon reagálni</a:t>
             </a:r>
           </a:p>
           <a:p>
@@ -1891,7 +1873,7 @@
     </p:spTree>
     <p:extLst>
       <p:ext uri="{BB962C8B-B14F-4D97-AF65-F5344CB8AC3E}">
-        <p14:creationId xmlns:p14="http://schemas.microsoft.com/office/powerpoint/2010/main" val="1706269299"/>
+        <p14:creationId xmlns:p14="http://schemas.microsoft.com/office/powerpoint/2010/main" val="4287810101"/>
       </p:ext>
     </p:extLst>
   </p:cSld>
@@ -1947,15 +1929,21 @@
           <a:p>
             <a:r>
               <a:rPr lang="hu-HU" dirty="0"/>
-              <a:t>méretbeli: felhasználók, </a:t>
+              <a:t>hozzáférési (</a:t>
             </a:r>
             <a:r>
               <a:rPr lang="hu-HU" dirty="0" err="1"/>
-              <a:t>process</a:t>
-            </a:r>
-            <a:r>
-              <a:rPr lang="hu-HU" dirty="0"/>
-              <a:t>-ek száma</a:t>
+              <a:t>access</a:t>
+            </a:r>
+            <a:r>
+              <a:rPr lang="hu-HU" dirty="0"/>
+              <a:t>): adatok tárolási módjának, belső reprezentációjának elfedése (pl. ’/’</a:t>
+            </a:r>
+          </a:p>
+          <a:p>
+            <a:r>
+              <a:rPr lang="hu-HU" dirty="0"/>
+              <a:t>vagy ’\’ – közös interfész)</a:t>
             </a:r>
           </a:p>
           <a:p>
@@ -1964,7 +1952,15 @@
           <a:p>
             <a:r>
               <a:rPr lang="hu-HU" dirty="0"/>
-              <a:t>földrajzi: gépek közötti távolság</a:t>
+              <a:t>hely (</a:t>
+            </a:r>
+            <a:r>
+              <a:rPr lang="hu-HU" dirty="0" err="1"/>
+              <a:t>location</a:t>
+            </a:r>
+            <a:r>
+              <a:rPr lang="hu-HU" dirty="0"/>
+              <a:t>): fizikai hely elfedése, pl. globális névvel (pl. URL)</a:t>
             </a:r>
           </a:p>
           <a:p>
@@ -1973,7 +1969,15 @@
           <a:p>
             <a:r>
               <a:rPr lang="hu-HU" dirty="0"/>
-              <a:t>adminisztratív: adat tárolási/kiadási stratégiák összehangolása</a:t>
+              <a:t>mozgatási (</a:t>
+            </a:r>
+            <a:r>
+              <a:rPr lang="hu-HU" dirty="0" err="1"/>
+              <a:t>migration</a:t>
+            </a:r>
+            <a:r>
+              <a:rPr lang="hu-HU" dirty="0"/>
+              <a:t>): szerver fizikai mozgatása ne érintse a felhasználót</a:t>
             </a:r>
           </a:p>
           <a:p>
@@ -1981,12 +1985,54 @@
           </a:p>
           <a:p>
             <a:r>
-              <a:rPr lang="hu-HU" dirty="0"/>
-              <a:t>Az első megoldható erős gépekkel, az utóbbi kettőnél van nehézség.</a:t>
+              <a:rPr lang="hu-HU" dirty="0" err="1"/>
+              <a:t>relokációs</a:t>
+            </a:r>
+            <a:r>
+              <a:rPr lang="hu-HU" dirty="0"/>
+              <a:t>: a kliens ne tudjon arról, hogy másik kiszolgálóra váltott a rendszer (pl. váltás egyik</a:t>
+            </a:r>
+          </a:p>
+          <a:p>
+            <a:r>
+              <a:rPr lang="hu-HU" dirty="0"/>
+              <a:t>adatbázisról a másikra, vagy wifi esetén séta -&gt; másik router)</a:t>
             </a:r>
           </a:p>
           <a:p>
             <a:endParaRPr lang="hu-HU" dirty="0"/>
+          </a:p>
+          <a:p>
+            <a:r>
+              <a:rPr lang="hu-HU" dirty="0"/>
+              <a:t>replikációs: felhasználó ne lássa, hogy melyik </a:t>
+            </a:r>
+            <a:r>
+              <a:rPr lang="hu-HU" dirty="0" err="1"/>
+              <a:t>replikátumból</a:t>
+            </a:r>
+            <a:r>
+              <a:rPr lang="hu-HU" dirty="0"/>
+              <a:t> kapja az adatot</a:t>
+            </a:r>
+          </a:p>
+          <a:p>
+            <a:endParaRPr lang="hu-HU" dirty="0"/>
+          </a:p>
+          <a:p>
+            <a:r>
+              <a:rPr lang="hu-HU" dirty="0"/>
+              <a:t>konkurencia: az alkalmazásnak nem kell tudnia, hogy más is használja az erőforrást</a:t>
+            </a:r>
+          </a:p>
+          <a:p>
+            <a:endParaRPr lang="hu-HU" dirty="0"/>
+          </a:p>
+          <a:p>
+            <a:r>
+              <a:rPr lang="hu-HU" dirty="0"/>
+              <a:t>hibatűrés: felhasználó ne lássa a hibát</a:t>
+            </a:r>
           </a:p>
         </p:txBody>
       </p:sp>
@@ -2016,7 +2062,7 @@
     </p:spTree>
     <p:extLst>
       <p:ext uri="{BB962C8B-B14F-4D97-AF65-F5344CB8AC3E}">
-        <p14:creationId xmlns:p14="http://schemas.microsoft.com/office/powerpoint/2010/main" val="1821942694"/>
+        <p14:creationId xmlns:p14="http://schemas.microsoft.com/office/powerpoint/2010/main" val="4176186853"/>
       </p:ext>
     </p:extLst>
   </p:cSld>
@@ -2072,15 +2118,19 @@
           <a:p>
             <a:r>
               <a:rPr lang="hu-HU" dirty="0"/>
-              <a:t>Sok osztott rendszer úgy van beállítva, hogy nagy </a:t>
-            </a:r>
-            <a:r>
-              <a:rPr lang="hu-HU" dirty="0" err="1"/>
-              <a:t>teljesíményű</a:t>
-            </a:r>
-            <a:r>
-              <a:rPr lang="hu-HU" dirty="0"/>
-              <a:t> számítást végezzenek</a:t>
+              <a:t>milyen nyelv? Java? C? -&gt; kell egy jól definiált interfész. ez különböző erősségű lehet:</a:t>
+            </a:r>
+          </a:p>
+          <a:p>
+            <a:r>
+              <a:rPr lang="hu-HU" dirty="0"/>
+              <a:t>    o teljesség: megmondjuk, mit kell csinálni</a:t>
+            </a:r>
+          </a:p>
+          <a:p>
+            <a:r>
+              <a:rPr lang="hu-HU" dirty="0"/>
+              <a:t>    o semlegesség: nem mondjuk meg, hogyan csinálja</a:t>
             </a:r>
           </a:p>
           <a:p>
@@ -2089,28 +2139,20 @@
           <a:p>
             <a:r>
               <a:rPr lang="hu-HU" dirty="0"/>
-              <a:t>Lényegében egy csoport </a:t>
-            </a:r>
-            <a:r>
-              <a:rPr lang="hu-HU" dirty="0" err="1"/>
-              <a:t>high</a:t>
-            </a:r>
-            <a:r>
-              <a:rPr lang="hu-HU" dirty="0"/>
-              <a:t>-end rendszer LAN-on összekapcsolva:</a:t>
-            </a:r>
-          </a:p>
-          <a:p>
-            <a:r>
-              <a:rPr lang="hu-HU" dirty="0"/>
-              <a:t>    Homogén: ugyanaz az operációs rendszer, a hardver közel azonos</a:t>
-            </a:r>
-          </a:p>
-          <a:p>
-            <a:r>
-              <a:rPr lang="hu-HU" dirty="0"/>
-              <a:t>    Egyetlen irányító csomópont</a:t>
-            </a:r>
+              <a:t>hordozhatóság: egyik gépről a másikra (UNIX -&gt; Windows)</a:t>
+            </a:r>
+          </a:p>
+          <a:p>
+            <a:endParaRPr lang="hu-HU" dirty="0"/>
+          </a:p>
+          <a:p>
+            <a:r>
+              <a:rPr lang="hu-HU" dirty="0"/>
+              <a:t>műveletek közötti átjárhatóság (pl. komponens csere után is működik a rendszer)</a:t>
+            </a:r>
+          </a:p>
+          <a:p>
+            <a:endParaRPr lang="hu-HU" dirty="0"/>
           </a:p>
         </p:txBody>
       </p:sp>
@@ -2131,7 +2173,7 @@
           <a:p>
             <a:fld id="{674FF4E3-1DEA-4DBB-AF74-DDA85AC22194}" type="slidenum">
               <a:rPr lang="hu-HU" smtClean="0"/>
-              <a:t>21</a:t>
+              <a:t>20</a:t>
             </a:fld>
             <a:endParaRPr lang="hu-HU"/>
           </a:p>
@@ -2140,7 +2182,7 @@
     </p:spTree>
     <p:extLst>
       <p:ext uri="{BB962C8B-B14F-4D97-AF65-F5344CB8AC3E}">
-        <p14:creationId xmlns:p14="http://schemas.microsoft.com/office/powerpoint/2010/main" val="4022098739"/>
+        <p14:creationId xmlns:p14="http://schemas.microsoft.com/office/powerpoint/2010/main" val="1706269299"/>
       </p:ext>
     </p:extLst>
   </p:cSld>
@@ -2280,13 +2322,15 @@
           <a:p>
             <a:r>
               <a:rPr lang="hu-HU" dirty="0"/>
-              <a:t>Modell</a:t>
-            </a:r>
-          </a:p>
-          <a:p>
-            <a:r>
-              <a:rPr lang="hu-HU" dirty="0"/>
-              <a:t>A tranzakció műveletek gyűjteménye</a:t>
+              <a:t>méretbeli: felhasználók, </a:t>
+            </a:r>
+            <a:r>
+              <a:rPr lang="hu-HU" dirty="0" err="1"/>
+              <a:t>process</a:t>
+            </a:r>
+            <a:r>
+              <a:rPr lang="hu-HU" dirty="0"/>
+              <a:t>-ek száma</a:t>
             </a:r>
           </a:p>
           <a:p>
@@ -2294,18 +2338,8 @@
           </a:p>
           <a:p>
             <a:r>
-              <a:rPr lang="hu-HU" dirty="0" err="1"/>
-              <a:t>Atomosság</a:t>
-            </a:r>
-            <a:r>
-              <a:rPr lang="hu-HU" dirty="0"/>
-              <a:t>: vagy minden műveletet végrehajtunk, vagy egyiket</a:t>
-            </a:r>
-          </a:p>
-          <a:p>
-            <a:r>
-              <a:rPr lang="hu-HU" dirty="0"/>
-              <a:t>sem. Ha a tranzakció nem sikerül, az objektum állapota sértetlen marad.</a:t>
+              <a:rPr lang="hu-HU" dirty="0"/>
+              <a:t>földrajzi: gépek közötti távolság</a:t>
             </a:r>
           </a:p>
           <a:p>
@@ -2314,19 +2348,7 @@
           <a:p>
             <a:r>
               <a:rPr lang="hu-HU" dirty="0"/>
-              <a:t>Konzisztencia: A tranzakció érvényes állapotátmenetet hoz</a:t>
-            </a:r>
-          </a:p>
-          <a:p>
-            <a:r>
-              <a:rPr lang="hu-HU" dirty="0"/>
-              <a:t>létre. Ez nem zárja ki az érvénytelen köztes pillanatokat a tranzakció</a:t>
-            </a:r>
-          </a:p>
-          <a:p>
-            <a:r>
-              <a:rPr lang="hu-HU" dirty="0"/>
-              <a:t>végrehajtása során. </a:t>
+              <a:t>adminisztratív: adat tárolási/kiadási stratégiák összehangolása</a:t>
             </a:r>
           </a:p>
           <a:p>
@@ -2335,49 +2357,11 @@
           <a:p>
             <a:r>
               <a:rPr lang="hu-HU" dirty="0"/>
-              <a:t>Elkülönítés: Az egyidejű tranzakciók nem zavarják egymást. Minden</a:t>
-            </a:r>
-          </a:p>
-          <a:p>
-            <a:r>
-              <a:rPr lang="hu-HU" dirty="0"/>
-              <a:t>tranzakciónak látszólag úgy kell lefutnia, mintha ez alatt az idő alatt</a:t>
-            </a:r>
-          </a:p>
-          <a:p>
-            <a:r>
-              <a:rPr lang="hu-HU" dirty="0"/>
-              <a:t>semmilyen másik tranzakciót sem hajtanánk végre.</a:t>
+              <a:t>Az első megoldható erős gépekkel, az utóbbi kettőnél van nehézség.</a:t>
             </a:r>
           </a:p>
           <a:p>
             <a:endParaRPr lang="hu-HU" dirty="0"/>
-          </a:p>
-          <a:p>
-            <a:r>
-              <a:rPr lang="hu-HU" dirty="0"/>
-              <a:t>Tartósság: Egy tranzakció végrehajtása után, annak hatásai</a:t>
-            </a:r>
-          </a:p>
-          <a:p>
-            <a:r>
-              <a:rPr lang="hu-HU" dirty="0"/>
-              <a:t>állandósulnak: ha egyszer egy tranzakció befejeződött, akkor már soha</a:t>
-            </a:r>
-          </a:p>
-          <a:p>
-            <a:r>
-              <a:rPr lang="hu-HU" dirty="0"/>
-              <a:t>többé nem </a:t>
-            </a:r>
-            <a:r>
-              <a:rPr lang="hu-HU" dirty="0" err="1"/>
-              <a:t>veszhet</a:t>
-            </a:r>
-            <a:r>
-              <a:rPr lang="hu-HU" dirty="0"/>
-              <a:t> el a tranzakció hatása.</a:t>
-            </a:r>
           </a:p>
         </p:txBody>
       </p:sp>
@@ -2398,7 +2382,7 @@
           <a:p>
             <a:fld id="{674FF4E3-1DEA-4DBB-AF74-DDA85AC22194}" type="slidenum">
               <a:rPr lang="hu-HU" smtClean="0"/>
-              <a:t>22</a:t>
+              <a:t>21</a:t>
             </a:fld>
             <a:endParaRPr lang="hu-HU"/>
           </a:p>
@@ -2407,7 +2391,7 @@
     </p:spTree>
     <p:extLst>
       <p:ext uri="{BB962C8B-B14F-4D97-AF65-F5344CB8AC3E}">
-        <p14:creationId xmlns:p14="http://schemas.microsoft.com/office/powerpoint/2010/main" val="1059871835"/>
+        <p14:creationId xmlns:p14="http://schemas.microsoft.com/office/powerpoint/2010/main" val="1821942694"/>
       </p:ext>
     </p:extLst>
   </p:cSld>
@@ -2463,76 +2447,44 @@
           <a:p>
             <a:r>
               <a:rPr lang="hu-HU" dirty="0"/>
-              <a:t>Feltörekvő következő generációs osztott rendszerek, ahol a csomópontok aprók,</a:t>
-            </a:r>
-          </a:p>
-          <a:p>
+              <a:t>Sok osztott rendszer úgy van beállítva, hogy nagy </a:t>
+            </a:r>
             <a:r>
               <a:rPr lang="hu-HU" dirty="0" err="1"/>
-              <a:t>mobilisak</a:t>
-            </a:r>
-            <a:r>
-              <a:rPr lang="hu-HU" dirty="0"/>
-              <a:t>, és gyakran a nagyobb rendszerbe </a:t>
+              <a:t>teljesíményű</a:t>
+            </a:r>
+            <a:r>
+              <a:rPr lang="hu-HU" dirty="0"/>
+              <a:t> számítást végezzenek</a:t>
+            </a:r>
+          </a:p>
+          <a:p>
+            <a:endParaRPr lang="hu-HU" dirty="0"/>
+          </a:p>
+          <a:p>
+            <a:r>
+              <a:rPr lang="hu-HU" dirty="0"/>
+              <a:t>Lényegében egy csoport </a:t>
             </a:r>
             <a:r>
               <a:rPr lang="hu-HU" dirty="0" err="1"/>
-              <a:t>ágyazottak</a:t>
-            </a:r>
-            <a:r>
-              <a:rPr lang="hu-HU" dirty="0"/>
-              <a:t>.</a:t>
-            </a:r>
-          </a:p>
-          <a:p>
-            <a:endParaRPr lang="hu-HU" dirty="0"/>
-          </a:p>
-          <a:p>
-            <a:r>
-              <a:rPr lang="hu-HU" dirty="0"/>
-              <a:t>Kontextuális változás: A rendszer része egy olyan környezetnek, amelyben</a:t>
-            </a:r>
-          </a:p>
-          <a:p>
-            <a:r>
-              <a:rPr lang="hu-HU" dirty="0"/>
-              <a:t>változásokat azonnal el kell számolni.</a:t>
-            </a:r>
-          </a:p>
-          <a:p>
-            <a:endParaRPr lang="hu-HU" dirty="0"/>
-          </a:p>
-          <a:p>
-            <a:r>
-              <a:rPr lang="hu-HU" dirty="0"/>
-              <a:t>Ad hoc összetétel: Minden egyes csomópontot különböző felhasználók, akár</a:t>
-            </a:r>
-          </a:p>
-          <a:p>
-            <a:r>
-              <a:rPr lang="hu-HU" dirty="0"/>
-              <a:t>nagyon különböző módon használhatnak. Szükséges a könnyű konfiguráció.</a:t>
-            </a:r>
-          </a:p>
-          <a:p>
-            <a:endParaRPr lang="hu-HU" dirty="0"/>
-          </a:p>
-          <a:p>
-            <a:r>
-              <a:rPr lang="hu-HU" dirty="0"/>
-              <a:t>A megosztás az alapértelmezett: Csomópontok jönnek és mennek,</a:t>
-            </a:r>
-          </a:p>
-          <a:p>
-            <a:r>
-              <a:rPr lang="hu-HU" dirty="0"/>
-              <a:t>megosztható szolgáltatásokat és információkat kínálnak. Ez ismét az egyszerűségre</a:t>
-            </a:r>
-          </a:p>
-          <a:p>
-            <a:r>
-              <a:rPr lang="hu-HU" dirty="0"/>
-              <a:t>hívja fel a figyelmet.</a:t>
+              <a:t>high</a:t>
+            </a:r>
+            <a:r>
+              <a:rPr lang="hu-HU" dirty="0"/>
+              <a:t>-end rendszer LAN-on összekapcsolva:</a:t>
+            </a:r>
+          </a:p>
+          <a:p>
+            <a:r>
+              <a:rPr lang="hu-HU" dirty="0"/>
+              <a:t>    Homogén: ugyanaz az operációs rendszer, a hardver közel azonos</a:t>
+            </a:r>
+          </a:p>
+          <a:p>
+            <a:r>
+              <a:rPr lang="hu-HU" dirty="0"/>
+              <a:t>    Egyetlen irányító csomópont</a:t>
             </a:r>
           </a:p>
         </p:txBody>
@@ -2563,7 +2515,7 @@
     </p:spTree>
     <p:extLst>
       <p:ext uri="{BB962C8B-B14F-4D97-AF65-F5344CB8AC3E}">
-        <p14:creationId xmlns:p14="http://schemas.microsoft.com/office/powerpoint/2010/main" val="3891131099"/>
+        <p14:creationId xmlns:p14="http://schemas.microsoft.com/office/powerpoint/2010/main" val="4022098739"/>
       </p:ext>
     </p:extLst>
   </p:cSld>
@@ -2619,61 +2571,103 @@
           <a:p>
             <a:r>
               <a:rPr lang="hu-HU" dirty="0"/>
-              <a:t>A </a:t>
-            </a:r>
+              <a:t>Modell</a:t>
+            </a:r>
+          </a:p>
+          <a:p>
+            <a:r>
+              <a:rPr lang="hu-HU" dirty="0"/>
+              <a:t>A tranzakció műveletek gyűjteménye</a:t>
+            </a:r>
+          </a:p>
+          <a:p>
+            <a:endParaRPr lang="hu-HU" dirty="0"/>
+          </a:p>
+          <a:p>
             <a:r>
               <a:rPr lang="hu-HU" dirty="0" err="1"/>
-              <a:t>singleton</a:t>
-            </a:r>
-            <a:r>
-              <a:rPr lang="hu-HU" dirty="0"/>
-              <a:t> (magyarul egyke) minta lényege, hogy az adott osztályunknak maximum egy példánya lehet. </a:t>
-            </a:r>
-          </a:p>
-          <a:p>
-            <a:r>
-              <a:rPr lang="hu-HU" dirty="0"/>
-              <a:t>Ezt úgy tudjuk elérni, ha megakadályozzuk, hogy a </a:t>
+              <a:t>Atomosság</a:t>
+            </a:r>
+            <a:r>
+              <a:rPr lang="hu-HU" dirty="0"/>
+              <a:t>: vagy minden műveletet végrehajtunk, vagy egyiket</a:t>
+            </a:r>
+          </a:p>
+          <a:p>
+            <a:r>
+              <a:rPr lang="hu-HU" dirty="0"/>
+              <a:t>sem. Ha a tranzakció nem sikerül, az objektum állapota sértetlen marad.</a:t>
+            </a:r>
+          </a:p>
+          <a:p>
+            <a:endParaRPr lang="hu-HU" dirty="0"/>
+          </a:p>
+          <a:p>
+            <a:r>
+              <a:rPr lang="hu-HU" dirty="0"/>
+              <a:t>Konzisztencia: A tranzakció érvényes állapotátmenetet hoz</a:t>
+            </a:r>
+          </a:p>
+          <a:p>
+            <a:r>
+              <a:rPr lang="hu-HU" dirty="0"/>
+              <a:t>létre. Ez nem zárja ki az érvénytelen köztes pillanatokat a tranzakció</a:t>
+            </a:r>
+          </a:p>
+          <a:p>
+            <a:r>
+              <a:rPr lang="hu-HU" dirty="0"/>
+              <a:t>végrehajtása során. </a:t>
+            </a:r>
+          </a:p>
+          <a:p>
+            <a:endParaRPr lang="hu-HU" dirty="0"/>
+          </a:p>
+          <a:p>
+            <a:r>
+              <a:rPr lang="hu-HU" dirty="0"/>
+              <a:t>Elkülönítés: Az egyidejű tranzakciók nem zavarják egymást. Minden</a:t>
+            </a:r>
+          </a:p>
+          <a:p>
+            <a:r>
+              <a:rPr lang="hu-HU" dirty="0"/>
+              <a:t>tranzakciónak látszólag úgy kell lefutnia, mintha ez alatt az idő alatt</a:t>
+            </a:r>
+          </a:p>
+          <a:p>
+            <a:r>
+              <a:rPr lang="hu-HU" dirty="0"/>
+              <a:t>semmilyen másik tranzakciót sem hajtanánk végre.</a:t>
+            </a:r>
+          </a:p>
+          <a:p>
+            <a:endParaRPr lang="hu-HU" dirty="0"/>
+          </a:p>
+          <a:p>
+            <a:r>
+              <a:rPr lang="hu-HU" dirty="0"/>
+              <a:t>Tartósság: Egy tranzakció végrehajtása után, annak hatásai</a:t>
+            </a:r>
+          </a:p>
+          <a:p>
+            <a:r>
+              <a:rPr lang="hu-HU" dirty="0"/>
+              <a:t>állandósulnak: ha egyszer egy tranzakció befejeződött, akkor már soha</a:t>
+            </a:r>
+          </a:p>
+          <a:p>
+            <a:r>
+              <a:rPr lang="hu-HU" dirty="0"/>
+              <a:t>többé nem </a:t>
             </a:r>
             <a:r>
               <a:rPr lang="hu-HU" dirty="0" err="1"/>
-              <a:t>new</a:t>
-            </a:r>
-            <a:r>
-              <a:rPr lang="hu-HU" dirty="0"/>
-              <a:t> kulcsszóval </a:t>
-            </a:r>
-            <a:r>
-              <a:rPr lang="hu-HU" dirty="0" err="1"/>
-              <a:t>példányosítani</a:t>
-            </a:r>
-            <a:r>
-              <a:rPr lang="hu-HU" dirty="0"/>
-              <a:t> lehessen (tehát egy </a:t>
-            </a:r>
-            <a:r>
-              <a:rPr lang="hu-HU" dirty="0" err="1"/>
-              <a:t>private</a:t>
-            </a:r>
-            <a:r>
-              <a:rPr lang="hu-HU" dirty="0"/>
-              <a:t> konstruktort definiálunk az osztályunkon belül), ellenben egy publikus interfészen keresztül lehetővé tesszük ennek az egy példánynak a létrehozását és elérését. Erre egy statikus metódust fogunk használni, hiszen az </a:t>
-            </a:r>
-            <a:r>
-              <a:rPr lang="hu-HU" dirty="0" err="1"/>
-              <a:t>példányosítás</a:t>
-            </a:r>
-            <a:r>
-              <a:rPr lang="hu-HU" dirty="0"/>
-              <a:t> nélkül is rendelkezésünkre áll. Példa </a:t>
-            </a:r>
-            <a:r>
-              <a:rPr lang="hu-HU" dirty="0" err="1"/>
-              <a:t>minderre</a:t>
-            </a:r>
-            <a:r>
-              <a:rPr lang="hu-HU" dirty="0"/>
-              <a:t>:</a:t>
+              <a:t>veszhet</a:t>
+            </a:r>
+            <a:r>
+              <a:rPr lang="hu-HU" dirty="0"/>
+              <a:t> el a tranzakció hatása.</a:t>
             </a:r>
           </a:p>
         </p:txBody>
@@ -2704,7 +2698,323 @@
     </p:spTree>
     <p:extLst>
       <p:ext uri="{BB962C8B-B14F-4D97-AF65-F5344CB8AC3E}">
-        <p14:creationId xmlns:p14="http://schemas.microsoft.com/office/powerpoint/2010/main" val="4258266632"/>
+        <p14:creationId xmlns:p14="http://schemas.microsoft.com/office/powerpoint/2010/main" val="1059871835"/>
+      </p:ext>
+    </p:extLst>
+  </p:cSld>
+  <p:clrMapOvr>
+    <a:masterClrMapping/>
+  </p:clrMapOvr>
+</p:notes>
+</file>
+
+<file path=ppt/notesSlides/notesSlide23.xml><?xml version="1.0" encoding="utf-8"?>
+<p:notes xmlns:a="http://schemas.openxmlformats.org/drawingml/2006/main" xmlns:r="http://schemas.openxmlformats.org/officeDocument/2006/relationships" xmlns:p="http://schemas.openxmlformats.org/presentationml/2006/main">
+  <p:cSld>
+    <p:spTree>
+      <p:nvGrpSpPr>
+        <p:cNvPr id="1" name=""/>
+        <p:cNvGrpSpPr/>
+        <p:nvPr/>
+      </p:nvGrpSpPr>
+      <p:grpSpPr>
+        <a:xfrm>
+          <a:off x="0" y="0"/>
+          <a:ext cx="0" cy="0"/>
+          <a:chOff x="0" y="0"/>
+          <a:chExt cx="0" cy="0"/>
+        </a:xfrm>
+      </p:grpSpPr>
+      <p:sp>
+        <p:nvSpPr>
+          <p:cNvPr id="2" name="Diakép helye 1"/>
+          <p:cNvSpPr>
+            <a:spLocks noGrp="1" noRot="1" noChangeAspect="1"/>
+          </p:cNvSpPr>
+          <p:nvPr>
+            <p:ph type="sldImg"/>
+          </p:nvPr>
+        </p:nvSpPr>
+        <p:spPr/>
+      </p:sp>
+      <p:sp>
+        <p:nvSpPr>
+          <p:cNvPr id="3" name="Jegyzetek helye 2"/>
+          <p:cNvSpPr>
+            <a:spLocks noGrp="1"/>
+          </p:cNvSpPr>
+          <p:nvPr>
+            <p:ph type="body" idx="1"/>
+          </p:nvPr>
+        </p:nvSpPr>
+        <p:spPr/>
+        <p:txBody>
+          <a:bodyPr/>
+          <a:lstStyle/>
+          <a:p>
+            <a:r>
+              <a:rPr lang="hu-HU" dirty="0"/>
+              <a:t>Feltörekvő következő generációs osztott rendszerek, ahol a csomópontok aprók,</a:t>
+            </a:r>
+          </a:p>
+          <a:p>
+            <a:r>
+              <a:rPr lang="hu-HU" dirty="0" err="1"/>
+              <a:t>mobilisak</a:t>
+            </a:r>
+            <a:r>
+              <a:rPr lang="hu-HU" dirty="0"/>
+              <a:t>, és gyakran a nagyobb rendszerbe </a:t>
+            </a:r>
+            <a:r>
+              <a:rPr lang="hu-HU" dirty="0" err="1"/>
+              <a:t>ágyazottak</a:t>
+            </a:r>
+            <a:r>
+              <a:rPr lang="hu-HU" dirty="0"/>
+              <a:t>.</a:t>
+            </a:r>
+          </a:p>
+          <a:p>
+            <a:endParaRPr lang="hu-HU" dirty="0"/>
+          </a:p>
+          <a:p>
+            <a:r>
+              <a:rPr lang="hu-HU" dirty="0"/>
+              <a:t>Kontextuális változás: A rendszer része egy olyan környezetnek, amelyben</a:t>
+            </a:r>
+          </a:p>
+          <a:p>
+            <a:r>
+              <a:rPr lang="hu-HU" dirty="0"/>
+              <a:t>változásokat azonnal el kell számolni.</a:t>
+            </a:r>
+          </a:p>
+          <a:p>
+            <a:endParaRPr lang="hu-HU" dirty="0"/>
+          </a:p>
+          <a:p>
+            <a:r>
+              <a:rPr lang="hu-HU" dirty="0"/>
+              <a:t>Ad hoc összetétel: Minden egyes csomópontot különböző felhasználók, akár</a:t>
+            </a:r>
+          </a:p>
+          <a:p>
+            <a:r>
+              <a:rPr lang="hu-HU" dirty="0"/>
+              <a:t>nagyon különböző módon használhatnak. Szükséges a könnyű konfiguráció.</a:t>
+            </a:r>
+          </a:p>
+          <a:p>
+            <a:endParaRPr lang="hu-HU" dirty="0"/>
+          </a:p>
+          <a:p>
+            <a:r>
+              <a:rPr lang="hu-HU" dirty="0"/>
+              <a:t>A megosztás az alapértelmezett: Csomópontok jönnek és mennek,</a:t>
+            </a:r>
+          </a:p>
+          <a:p>
+            <a:r>
+              <a:rPr lang="hu-HU" dirty="0"/>
+              <a:t>megosztható szolgáltatásokat és információkat kínálnak. Ez ismét az egyszerűségre</a:t>
+            </a:r>
+          </a:p>
+          <a:p>
+            <a:r>
+              <a:rPr lang="hu-HU" dirty="0"/>
+              <a:t>hívja fel a figyelmet.</a:t>
+            </a:r>
+          </a:p>
+        </p:txBody>
+      </p:sp>
+      <p:sp>
+        <p:nvSpPr>
+          <p:cNvPr id="4" name="Dia számának helye 3"/>
+          <p:cNvSpPr>
+            <a:spLocks noGrp="1"/>
+          </p:cNvSpPr>
+          <p:nvPr>
+            <p:ph type="sldNum" sz="quarter" idx="5"/>
+          </p:nvPr>
+        </p:nvSpPr>
+        <p:spPr/>
+        <p:txBody>
+          <a:bodyPr/>
+          <a:lstStyle/>
+          <a:p>
+            <a:fld id="{674FF4E3-1DEA-4DBB-AF74-DDA85AC22194}" type="slidenum">
+              <a:rPr lang="hu-HU" smtClean="0"/>
+              <a:t>25</a:t>
+            </a:fld>
+            <a:endParaRPr lang="hu-HU"/>
+          </a:p>
+        </p:txBody>
+      </p:sp>
+    </p:spTree>
+    <p:extLst>
+      <p:ext uri="{BB962C8B-B14F-4D97-AF65-F5344CB8AC3E}">
+        <p14:creationId xmlns:p14="http://schemas.microsoft.com/office/powerpoint/2010/main" val="3891131099"/>
+      </p:ext>
+    </p:extLst>
+  </p:cSld>
+  <p:clrMapOvr>
+    <a:masterClrMapping/>
+  </p:clrMapOvr>
+</p:notes>
+</file>
+
+<file path=ppt/notesSlides/notesSlide24.xml><?xml version="1.0" encoding="utf-8"?>
+<p:notes xmlns:a="http://schemas.openxmlformats.org/drawingml/2006/main" xmlns:r="http://schemas.openxmlformats.org/officeDocument/2006/relationships" xmlns:p="http://schemas.openxmlformats.org/presentationml/2006/main">
+  <p:cSld>
+    <p:spTree>
+      <p:nvGrpSpPr>
+        <p:cNvPr id="1" name=""/>
+        <p:cNvGrpSpPr/>
+        <p:nvPr/>
+      </p:nvGrpSpPr>
+      <p:grpSpPr>
+        <a:xfrm>
+          <a:off x="0" y="0"/>
+          <a:ext cx="0" cy="0"/>
+          <a:chOff x="0" y="0"/>
+          <a:chExt cx="0" cy="0"/>
+        </a:xfrm>
+      </p:grpSpPr>
+      <p:sp>
+        <p:nvSpPr>
+          <p:cNvPr id="2" name="Diakép helye 1"/>
+          <p:cNvSpPr>
+            <a:spLocks noGrp="1" noRot="1" noChangeAspect="1"/>
+          </p:cNvSpPr>
+          <p:nvPr>
+            <p:ph type="sldImg"/>
+          </p:nvPr>
+        </p:nvSpPr>
+        <p:spPr/>
+      </p:sp>
+      <p:sp>
+        <p:nvSpPr>
+          <p:cNvPr id="3" name="Jegyzetek helye 2"/>
+          <p:cNvSpPr>
+            <a:spLocks noGrp="1"/>
+          </p:cNvSpPr>
+          <p:nvPr>
+            <p:ph type="body" idx="1"/>
+          </p:nvPr>
+        </p:nvSpPr>
+        <p:spPr/>
+        <p:txBody>
+          <a:bodyPr/>
+          <a:lstStyle/>
+          <a:p>
+            <a:r>
+              <a:rPr lang="hu-HU" dirty="0"/>
+              <a:t>A Microsoft </a:t>
+            </a:r>
+            <a:r>
+              <a:rPr lang="hu-HU" dirty="0" err="1"/>
+              <a:t>Azure</a:t>
+            </a:r>
+            <a:r>
+              <a:rPr lang="hu-HU" dirty="0"/>
+              <a:t> a Microsoft </a:t>
+            </a:r>
+            <a:r>
+              <a:rPr lang="hu-HU" dirty="0" err="1"/>
+              <a:t>cloud</a:t>
+            </a:r>
+            <a:r>
+              <a:rPr lang="hu-HU" dirty="0"/>
+              <a:t> </a:t>
+            </a:r>
+            <a:r>
+              <a:rPr lang="hu-HU" dirty="0" err="1"/>
+              <a:t>computing</a:t>
+            </a:r>
+            <a:r>
+              <a:rPr lang="hu-HU" dirty="0"/>
+              <a:t> platformja és infrastruktúrája, melynek segítségével alkalmazásokat lehet készíteni, telepíteni és futtatni a Microsoft által felügyelt adatközpontokon.</a:t>
+            </a:r>
+          </a:p>
+          <a:p>
+            <a:endParaRPr lang="hu-HU" dirty="0"/>
+          </a:p>
+          <a:p>
+            <a:r>
+              <a:rPr lang="hu-HU" dirty="0"/>
+              <a:t>A korábbiakban a „</a:t>
+            </a:r>
+            <a:r>
+              <a:rPr lang="hu-HU" dirty="0" err="1"/>
+              <a:t>Cloud</a:t>
+            </a:r>
+            <a:r>
+              <a:rPr lang="hu-HU" dirty="0"/>
+              <a:t>” név az úgynevezett „</a:t>
+            </a:r>
+            <a:r>
+              <a:rPr lang="hu-HU" dirty="0" err="1"/>
+              <a:t>cloud</a:t>
+            </a:r>
+            <a:r>
+              <a:rPr lang="hu-HU" dirty="0"/>
+              <a:t> </a:t>
+            </a:r>
+            <a:r>
+              <a:rPr lang="hu-HU" dirty="0" err="1"/>
+              <a:t>computing</a:t>
+            </a:r>
+            <a:r>
+              <a:rPr lang="hu-HU" dirty="0"/>
+              <a:t>” (vagyis számítási felhő) kifejezésre utal, melynek lényege, hogy az egyes alkalmazások nem a helyi munkaállomáson, hanem egy internetes szolgáltatás keretein belül valamilyen távoli kiszolgálón futnak. A fejlesztők a platformra gyakorlatilag tetszőleges, a Visual </a:t>
+            </a:r>
+            <a:r>
+              <a:rPr lang="hu-HU" dirty="0" err="1"/>
+              <a:t>Studio</a:t>
+            </a:r>
+            <a:r>
+              <a:rPr lang="hu-HU" dirty="0"/>
+              <a:t> környezet által támogatott .NET-alapú nyelven elkészíthetik alkalmazásaikat, amelyek feltöltéséhez, menedzseléséhez és frissítéséhez szintén magas szintű, könnyen kezelhető eszközöket biztosít az </a:t>
+            </a:r>
+            <a:r>
+              <a:rPr lang="hu-HU" dirty="0" err="1"/>
+              <a:t>Azure</a:t>
+            </a:r>
+            <a:r>
+              <a:rPr lang="hu-HU" dirty="0"/>
+              <a:t>.</a:t>
+            </a:r>
+          </a:p>
+        </p:txBody>
+      </p:sp>
+      <p:sp>
+        <p:nvSpPr>
+          <p:cNvPr id="4" name="Dia számának helye 3"/>
+          <p:cNvSpPr>
+            <a:spLocks noGrp="1"/>
+          </p:cNvSpPr>
+          <p:nvPr>
+            <p:ph type="sldNum" sz="quarter" idx="5"/>
+          </p:nvPr>
+        </p:nvSpPr>
+        <p:spPr/>
+        <p:txBody>
+          <a:bodyPr/>
+          <a:lstStyle/>
+          <a:p>
+            <a:fld id="{674FF4E3-1DEA-4DBB-AF74-DDA85AC22194}" type="slidenum">
+              <a:rPr lang="hu-HU" smtClean="0"/>
+              <a:t>26</a:t>
+            </a:fld>
+            <a:endParaRPr lang="hu-HU"/>
+          </a:p>
+        </p:txBody>
+      </p:sp>
+    </p:spTree>
+    <p:extLst>
+      <p:ext uri="{BB962C8B-B14F-4D97-AF65-F5344CB8AC3E}">
+        <p14:creationId xmlns:p14="http://schemas.microsoft.com/office/powerpoint/2010/main" val="2030190753"/>
       </p:ext>
     </p:extLst>
   </p:cSld>
@@ -4004,7 +4314,7 @@
           <a:p>
             <a:fld id="{74D6CE58-D5BF-4592-BBC8-A7847BDADEB9}" type="datetimeFigureOut">
               <a:rPr lang="hu-HU" smtClean="0"/>
-              <a:t>2021. 10. 26.</a:t>
+              <a:t>2021. 11. 11.</a:t>
             </a:fld>
             <a:endParaRPr lang="hu-HU"/>
           </a:p>
@@ -4202,7 +4512,7 @@
           <a:p>
             <a:fld id="{74D6CE58-D5BF-4592-BBC8-A7847BDADEB9}" type="datetimeFigureOut">
               <a:rPr lang="hu-HU" smtClean="0"/>
-              <a:t>2021. 10. 26.</a:t>
+              <a:t>2021. 11. 11.</a:t>
             </a:fld>
             <a:endParaRPr lang="hu-HU"/>
           </a:p>
@@ -4410,7 +4720,7 @@
           <a:p>
             <a:fld id="{74D6CE58-D5BF-4592-BBC8-A7847BDADEB9}" type="datetimeFigureOut">
               <a:rPr lang="hu-HU" smtClean="0"/>
-              <a:t>2021. 10. 26.</a:t>
+              <a:t>2021. 11. 11.</a:t>
             </a:fld>
             <a:endParaRPr lang="hu-HU"/>
           </a:p>
@@ -4608,7 +4918,7 @@
           <a:p>
             <a:fld id="{74D6CE58-D5BF-4592-BBC8-A7847BDADEB9}" type="datetimeFigureOut">
               <a:rPr lang="hu-HU" smtClean="0"/>
-              <a:t>2021. 10. 26.</a:t>
+              <a:t>2021. 11. 11.</a:t>
             </a:fld>
             <a:endParaRPr lang="hu-HU"/>
           </a:p>
@@ -4883,7 +5193,7 @@
           <a:p>
             <a:fld id="{74D6CE58-D5BF-4592-BBC8-A7847BDADEB9}" type="datetimeFigureOut">
               <a:rPr lang="hu-HU" smtClean="0"/>
-              <a:t>2021. 10. 26.</a:t>
+              <a:t>2021. 11. 11.</a:t>
             </a:fld>
             <a:endParaRPr lang="hu-HU"/>
           </a:p>
@@ -5148,7 +5458,7 @@
           <a:p>
             <a:fld id="{74D6CE58-D5BF-4592-BBC8-A7847BDADEB9}" type="datetimeFigureOut">
               <a:rPr lang="hu-HU" smtClean="0"/>
-              <a:t>2021. 10. 26.</a:t>
+              <a:t>2021. 11. 11.</a:t>
             </a:fld>
             <a:endParaRPr lang="hu-HU"/>
           </a:p>
@@ -5560,7 +5870,7 @@
           <a:p>
             <a:fld id="{74D6CE58-D5BF-4592-BBC8-A7847BDADEB9}" type="datetimeFigureOut">
               <a:rPr lang="hu-HU" smtClean="0"/>
-              <a:t>2021. 10. 26.</a:t>
+              <a:t>2021. 11. 11.</a:t>
             </a:fld>
             <a:endParaRPr lang="hu-HU"/>
           </a:p>
@@ -5701,7 +6011,7 @@
           <a:p>
             <a:fld id="{74D6CE58-D5BF-4592-BBC8-A7847BDADEB9}" type="datetimeFigureOut">
               <a:rPr lang="hu-HU" smtClean="0"/>
-              <a:t>2021. 10. 26.</a:t>
+              <a:t>2021. 11. 11.</a:t>
             </a:fld>
             <a:endParaRPr lang="hu-HU"/>
           </a:p>
@@ -5814,7 +6124,7 @@
           <a:p>
             <a:fld id="{74D6CE58-D5BF-4592-BBC8-A7847BDADEB9}" type="datetimeFigureOut">
               <a:rPr lang="hu-HU" smtClean="0"/>
-              <a:t>2021. 10. 26.</a:t>
+              <a:t>2021. 11. 11.</a:t>
             </a:fld>
             <a:endParaRPr lang="hu-HU"/>
           </a:p>
@@ -6125,7 +6435,7 @@
           <a:p>
             <a:fld id="{74D6CE58-D5BF-4592-BBC8-A7847BDADEB9}" type="datetimeFigureOut">
               <a:rPr lang="hu-HU" smtClean="0"/>
-              <a:t>2021. 10. 26.</a:t>
+              <a:t>2021. 11. 11.</a:t>
             </a:fld>
             <a:endParaRPr lang="hu-HU"/>
           </a:p>
@@ -6413,7 +6723,7 @@
           <a:p>
             <a:fld id="{74D6CE58-D5BF-4592-BBC8-A7847BDADEB9}" type="datetimeFigureOut">
               <a:rPr lang="hu-HU" smtClean="0"/>
-              <a:t>2021. 10. 26.</a:t>
+              <a:t>2021. 11. 11.</a:t>
             </a:fld>
             <a:endParaRPr lang="hu-HU"/>
           </a:p>
@@ -6654,7 +6964,7 @@
           <a:p>
             <a:fld id="{74D6CE58-D5BF-4592-BBC8-A7847BDADEB9}" type="datetimeFigureOut">
               <a:rPr lang="hu-HU" smtClean="0"/>
-              <a:t>2021. 10. 26.</a:t>
+              <a:t>2021. 11. 11.</a:t>
             </a:fld>
             <a:endParaRPr lang="hu-HU"/>
           </a:p>
@@ -7777,7 +8087,7 @@
           <p:cNvPr id="2" name="Cím 1">
             <a:extLst>
               <a:ext uri="{FF2B5EF4-FFF2-40B4-BE49-F238E27FC236}">
-                <a16:creationId xmlns:a16="http://schemas.microsoft.com/office/drawing/2014/main" id="{26E37692-A740-4301-B69C-723F1D60BB00}"/>
+                <a16:creationId xmlns:a16="http://schemas.microsoft.com/office/drawing/2014/main" id="{7442CE72-EE7D-407B-85F0-6A073EBD4443}"/>
               </a:ext>
             </a:extLst>
           </p:cNvPr>
@@ -7794,8 +8104,12 @@
           <a:lstStyle/>
           <a:p>
             <a:r>
-              <a:rPr lang="hu-HU" dirty="0"/>
-              <a:t>Elosztott rendszerek</a:t>
+              <a:rPr lang="hu-HU" dirty="0" err="1"/>
+              <a:t>Singleton</a:t>
+            </a:r>
+            <a:r>
+              <a:rPr lang="hu-HU" dirty="0"/>
+              <a:t> (egyke)</a:t>
             </a:r>
           </a:p>
         </p:txBody>
@@ -7805,7 +8119,7 @@
           <p:cNvPr id="3" name="Tartalom helye 2">
             <a:extLst>
               <a:ext uri="{FF2B5EF4-FFF2-40B4-BE49-F238E27FC236}">
-                <a16:creationId xmlns:a16="http://schemas.microsoft.com/office/drawing/2014/main" id="{58DAF19B-C437-4657-AA96-0FC2A7E5D7AA}"/>
+                <a16:creationId xmlns:a16="http://schemas.microsoft.com/office/drawing/2014/main" id="{058A94DF-818C-4D99-A173-0CF48C69A363}"/>
               </a:ext>
             </a:extLst>
           </p:cNvPr>
@@ -7823,29 +8137,27 @@
           <a:p>
             <a:r>
               <a:rPr lang="hu-HU" dirty="0"/>
-              <a:t>Független gépek </a:t>
+              <a:t>Osztályból példány konstruktorral</a:t>
+            </a:r>
+          </a:p>
+          <a:p>
+            <a:r>
+              <a:rPr lang="hu-HU" dirty="0"/>
+              <a:t>A konstruktor nem lehet publikus</a:t>
+            </a:r>
+          </a:p>
+          <a:p>
+            <a:r>
+              <a:rPr lang="hu-HU" dirty="0"/>
+              <a:t>Osztályszintű statikus metódus (</a:t>
             </a:r>
             <a:r>
               <a:rPr lang="hu-HU" dirty="0" err="1"/>
-              <a:t>sokassága</a:t>
-            </a:r>
-            <a:r>
-              <a:rPr lang="hu-HU" dirty="0"/>
-              <a:t>, melyek a </a:t>
-            </a:r>
-            <a:r>
-              <a:rPr lang="hu-HU" dirty="0" err="1"/>
-              <a:t>felahsználó</a:t>
-            </a:r>
-            <a:r>
-              <a:rPr lang="hu-HU" dirty="0"/>
-              <a:t> számára összefüggő rendszert alkotnak</a:t>
-            </a:r>
-          </a:p>
-          <a:p>
-            <a:r>
-              <a:rPr lang="hu-HU" dirty="0"/>
-              <a:t>Az osztott rendszer egy köztes réteg a gépek és alkalmazások között</a:t>
+              <a:t>getInstance</a:t>
+            </a:r>
+            <a:r>
+              <a:rPr lang="hu-HU" dirty="0"/>
+              <a:t>)</a:t>
             </a:r>
           </a:p>
         </p:txBody>
@@ -7853,7 +8165,7 @@
     </p:spTree>
     <p:extLst>
       <p:ext uri="{BB962C8B-B14F-4D97-AF65-F5344CB8AC3E}">
-        <p14:creationId xmlns:p14="http://schemas.microsoft.com/office/powerpoint/2010/main" val="1760733059"/>
+        <p14:creationId xmlns:p14="http://schemas.microsoft.com/office/powerpoint/2010/main" val="286922289"/>
       </p:ext>
     </p:extLst>
   </p:cSld>
@@ -7885,7 +8197,7 @@
           <p:cNvPr id="2" name="Cím 1">
             <a:extLst>
               <a:ext uri="{FF2B5EF4-FFF2-40B4-BE49-F238E27FC236}">
-                <a16:creationId xmlns:a16="http://schemas.microsoft.com/office/drawing/2014/main" id="{1D2529D6-1A36-447C-A61F-051D59CC4B7D}"/>
+                <a16:creationId xmlns:a16="http://schemas.microsoft.com/office/drawing/2014/main" id="{6AA5396E-AE2C-4633-B4E5-2AE704D2312B}"/>
               </a:ext>
             </a:extLst>
           </p:cNvPr>
@@ -7902,9 +8214,10 @@
           <a:lstStyle/>
           <a:p>
             <a:r>
-              <a:rPr lang="hu-HU" dirty="0"/>
-              <a:t>Tervezési szempontok</a:t>
-            </a:r>
+              <a:rPr lang="hu-HU" dirty="0" err="1"/>
+              <a:t>Lazyload</a:t>
+            </a:r>
+            <a:endParaRPr lang="hu-HU" dirty="0"/>
           </a:p>
         </p:txBody>
       </p:sp>
@@ -7913,7 +8226,7 @@
           <p:cNvPr id="3" name="Tartalom helye 2">
             <a:extLst>
               <a:ext uri="{FF2B5EF4-FFF2-40B4-BE49-F238E27FC236}">
-                <a16:creationId xmlns:a16="http://schemas.microsoft.com/office/drawing/2014/main" id="{0241F255-0B6F-4DFB-8448-0EE03BDCBECC}"/>
+                <a16:creationId xmlns:a16="http://schemas.microsoft.com/office/drawing/2014/main" id="{DDD95B1E-D935-499D-9E1F-E011EB499E6E}"/>
               </a:ext>
             </a:extLst>
           </p:cNvPr>
@@ -7924,37 +8237,24 @@
             <p:ph idx="1"/>
           </p:nvPr>
         </p:nvSpPr>
-        <p:spPr>
-          <a:xfrm>
-            <a:off x="838200" y="1914525"/>
-            <a:ext cx="10515600" cy="4351338"/>
-          </a:xfrm>
-        </p:spPr>
-        <p:txBody>
-          <a:bodyPr/>
-          <a:lstStyle/>
-          <a:p>
-            <a:r>
-              <a:rPr lang="hu-HU" dirty="0"/>
-              <a:t>Erőforrások elérhetővé tétele a felhasználónak</a:t>
-            </a:r>
-          </a:p>
-          <a:p>
-            <a:r>
-              <a:rPr lang="hu-HU" dirty="0"/>
-              <a:t>Átlátszóság</a:t>
-            </a:r>
-          </a:p>
-          <a:p>
-            <a:r>
-              <a:rPr lang="hu-HU" dirty="0"/>
-              <a:t>Nyíltság</a:t>
-            </a:r>
-          </a:p>
-          <a:p>
-            <a:r>
-              <a:rPr lang="hu-HU" dirty="0"/>
-              <a:t>Skálázhatóság</a:t>
+        <p:spPr/>
+        <p:txBody>
+          <a:bodyPr/>
+          <a:lstStyle/>
+          <a:p>
+            <a:r>
+              <a:rPr lang="hu-HU" dirty="0" err="1"/>
+              <a:t>Objekutum</a:t>
+            </a:r>
+            <a:r>
+              <a:rPr lang="hu-HU" dirty="0"/>
+              <a:t> létrehozás elhalasztása</a:t>
+            </a:r>
+          </a:p>
+          <a:p>
+            <a:r>
+              <a:rPr lang="hu-HU" dirty="0"/>
+              <a:t>Gyorsítja a kódot</a:t>
             </a:r>
           </a:p>
         </p:txBody>
@@ -7962,7 +8262,7 @@
     </p:spTree>
     <p:extLst>
       <p:ext uri="{BB962C8B-B14F-4D97-AF65-F5344CB8AC3E}">
-        <p14:creationId xmlns:p14="http://schemas.microsoft.com/office/powerpoint/2010/main" val="3902552877"/>
+        <p14:creationId xmlns:p14="http://schemas.microsoft.com/office/powerpoint/2010/main" val="1920193877"/>
       </p:ext>
     </p:extLst>
   </p:cSld>
@@ -7994,7 +8294,7 @@
           <p:cNvPr id="2" name="Cím 1">
             <a:extLst>
               <a:ext uri="{FF2B5EF4-FFF2-40B4-BE49-F238E27FC236}">
-                <a16:creationId xmlns:a16="http://schemas.microsoft.com/office/drawing/2014/main" id="{88606571-E834-4461-9608-E9CD7B9D12C3}"/>
+                <a16:creationId xmlns:a16="http://schemas.microsoft.com/office/drawing/2014/main" id="{26E37692-A740-4301-B69C-723F1D60BB00}"/>
               </a:ext>
             </a:extLst>
           </p:cNvPr>
@@ -8012,7 +8312,7 @@
           <a:p>
             <a:r>
               <a:rPr lang="hu-HU" dirty="0"/>
-              <a:t>Átlátszóság</a:t>
+              <a:t>Elosztott rendszerek</a:t>
             </a:r>
           </a:p>
         </p:txBody>
@@ -8022,7 +8322,7 @@
           <p:cNvPr id="3" name="Tartalom helye 2">
             <a:extLst>
               <a:ext uri="{FF2B5EF4-FFF2-40B4-BE49-F238E27FC236}">
-                <a16:creationId xmlns:a16="http://schemas.microsoft.com/office/drawing/2014/main" id="{B722AC36-A9B7-46F2-9DA5-44CAEEC6CD18}"/>
+                <a16:creationId xmlns:a16="http://schemas.microsoft.com/office/drawing/2014/main" id="{58DAF19B-C437-4657-AA96-0FC2A7E5D7AA}"/>
               </a:ext>
             </a:extLst>
           </p:cNvPr>
@@ -8040,44 +8340,29 @@
           <a:p>
             <a:r>
               <a:rPr lang="hu-HU" dirty="0"/>
-              <a:t>Hozzáférés</a:t>
-            </a:r>
-          </a:p>
-          <a:p>
-            <a:r>
-              <a:rPr lang="hu-HU" dirty="0"/>
-              <a:t>Hely elfedése</a:t>
-            </a:r>
-          </a:p>
-          <a:p>
-            <a:r>
-              <a:rPr lang="hu-HU" dirty="0"/>
-              <a:t>Mozgatás</a:t>
-            </a:r>
-          </a:p>
-          <a:p>
+              <a:t>Független gépek </a:t>
+            </a:r>
             <a:r>
               <a:rPr lang="hu-HU" dirty="0" err="1"/>
-              <a:t>Relokáció</a:t>
-            </a:r>
-            <a:endParaRPr lang="hu-HU" dirty="0"/>
-          </a:p>
-          <a:p>
-            <a:r>
-              <a:rPr lang="hu-HU" dirty="0"/>
-              <a:t>Replikáció</a:t>
-            </a:r>
-          </a:p>
-          <a:p>
-            <a:r>
-              <a:rPr lang="hu-HU" dirty="0"/>
-              <a:t>Konkurencia</a:t>
-            </a:r>
-          </a:p>
-          <a:p>
-            <a:r>
-              <a:rPr lang="hu-HU" dirty="0"/>
-              <a:t>Hibatűrés</a:t>
+              <a:t>sokassága</a:t>
+            </a:r>
+            <a:r>
+              <a:rPr lang="hu-HU" dirty="0"/>
+              <a:t>, melyek a </a:t>
+            </a:r>
+            <a:r>
+              <a:rPr lang="hu-HU" dirty="0" err="1"/>
+              <a:t>felahsználó</a:t>
+            </a:r>
+            <a:r>
+              <a:rPr lang="hu-HU" dirty="0"/>
+              <a:t> számára összefüggő rendszert alkotnak</a:t>
+            </a:r>
+          </a:p>
+          <a:p>
+            <a:r>
+              <a:rPr lang="hu-HU" dirty="0"/>
+              <a:t>Az osztott rendszer egy köztes réteg a gépek és alkalmazások között</a:t>
             </a:r>
           </a:p>
         </p:txBody>
@@ -8085,7 +8370,7 @@
     </p:spTree>
     <p:extLst>
       <p:ext uri="{BB962C8B-B14F-4D97-AF65-F5344CB8AC3E}">
-        <p14:creationId xmlns:p14="http://schemas.microsoft.com/office/powerpoint/2010/main" val="3650026717"/>
+        <p14:creationId xmlns:p14="http://schemas.microsoft.com/office/powerpoint/2010/main" val="1760733059"/>
       </p:ext>
     </p:extLst>
   </p:cSld>
@@ -8117,7 +8402,7 @@
           <p:cNvPr id="2" name="Cím 1">
             <a:extLst>
               <a:ext uri="{FF2B5EF4-FFF2-40B4-BE49-F238E27FC236}">
-                <a16:creationId xmlns:a16="http://schemas.microsoft.com/office/drawing/2014/main" id="{63BDAA71-EB16-4DF6-A996-1880DC7DAB52}"/>
+                <a16:creationId xmlns:a16="http://schemas.microsoft.com/office/drawing/2014/main" id="{1D2529D6-1A36-447C-A61F-051D59CC4B7D}"/>
               </a:ext>
             </a:extLst>
           </p:cNvPr>
@@ -8135,65 +8420,58 @@
           <a:p>
             <a:r>
               <a:rPr lang="hu-HU" dirty="0"/>
+              <a:t>Tervezési szempontok</a:t>
+            </a:r>
+          </a:p>
+        </p:txBody>
+      </p:sp>
+      <p:sp>
+        <p:nvSpPr>
+          <p:cNvPr id="3" name="Tartalom helye 2">
+            <a:extLst>
+              <a:ext uri="{FF2B5EF4-FFF2-40B4-BE49-F238E27FC236}">
+                <a16:creationId xmlns:a16="http://schemas.microsoft.com/office/drawing/2014/main" id="{0241F255-0B6F-4DFB-8448-0EE03BDCBECC}"/>
+              </a:ext>
+            </a:extLst>
+          </p:cNvPr>
+          <p:cNvSpPr>
+            <a:spLocks noGrp="1"/>
+          </p:cNvSpPr>
+          <p:nvPr>
+            <p:ph idx="1"/>
+          </p:nvPr>
+        </p:nvSpPr>
+        <p:spPr>
+          <a:xfrm>
+            <a:off x="838200" y="1914525"/>
+            <a:ext cx="10515600" cy="4351338"/>
+          </a:xfrm>
+        </p:spPr>
+        <p:txBody>
+          <a:bodyPr/>
+          <a:lstStyle/>
+          <a:p>
+            <a:r>
+              <a:rPr lang="hu-HU" dirty="0"/>
+              <a:t>Erőforrások elérhetővé tétele a felhasználónak</a:t>
+            </a:r>
+          </a:p>
+          <a:p>
+            <a:r>
+              <a:rPr lang="hu-HU" dirty="0"/>
+              <a:t>Átlátszóság</a:t>
+            </a:r>
+          </a:p>
+          <a:p>
+            <a:r>
+              <a:rPr lang="hu-HU" dirty="0"/>
               <a:t>Nyíltság</a:t>
             </a:r>
           </a:p>
-        </p:txBody>
-      </p:sp>
-      <p:sp>
-        <p:nvSpPr>
-          <p:cNvPr id="3" name="Tartalom helye 2">
-            <a:extLst>
-              <a:ext uri="{FF2B5EF4-FFF2-40B4-BE49-F238E27FC236}">
-                <a16:creationId xmlns:a16="http://schemas.microsoft.com/office/drawing/2014/main" id="{064CAF0D-A507-4AF7-837C-E9C64C324E72}"/>
-              </a:ext>
-            </a:extLst>
-          </p:cNvPr>
-          <p:cNvSpPr>
-            <a:spLocks noGrp="1"/>
-          </p:cNvSpPr>
-          <p:nvPr>
-            <p:ph idx="1"/>
-          </p:nvPr>
-        </p:nvSpPr>
-        <p:spPr/>
-        <p:txBody>
-          <a:bodyPr/>
-          <a:lstStyle/>
-          <a:p>
-            <a:r>
-              <a:rPr lang="hu-HU" dirty="0"/>
-              <a:t>Programnyelv</a:t>
-            </a:r>
-          </a:p>
-          <a:p>
-            <a:pPr lvl="1"/>
-            <a:r>
-              <a:rPr lang="hu-HU" dirty="0"/>
-              <a:t>Teljesség</a:t>
-            </a:r>
-          </a:p>
-          <a:p>
-            <a:pPr lvl="1"/>
-            <a:r>
-              <a:rPr lang="hu-HU" dirty="0"/>
-              <a:t>Semlegesség</a:t>
-            </a:r>
-          </a:p>
-          <a:p>
-            <a:pPr lvl="1"/>
-            <a:endParaRPr lang="hu-HU" dirty="0"/>
-          </a:p>
-          <a:p>
-            <a:r>
-              <a:rPr lang="hu-HU" dirty="0"/>
-              <a:t>Hordozhatóság</a:t>
-            </a:r>
-          </a:p>
-          <a:p>
-            <a:r>
-              <a:rPr lang="hu-HU" dirty="0"/>
-              <a:t>Műveletek közötti átjárhatóság</a:t>
+          <a:p>
+            <a:r>
+              <a:rPr lang="hu-HU" dirty="0"/>
+              <a:t>Skálázhatóság</a:t>
             </a:r>
           </a:p>
         </p:txBody>
@@ -8201,7 +8479,7 @@
     </p:spTree>
     <p:extLst>
       <p:ext uri="{BB962C8B-B14F-4D97-AF65-F5344CB8AC3E}">
-        <p14:creationId xmlns:p14="http://schemas.microsoft.com/office/powerpoint/2010/main" val="663386619"/>
+        <p14:creationId xmlns:p14="http://schemas.microsoft.com/office/powerpoint/2010/main" val="3902552877"/>
       </p:ext>
     </p:extLst>
   </p:cSld>
@@ -8233,7 +8511,7 @@
           <p:cNvPr id="2" name="Cím 1">
             <a:extLst>
               <a:ext uri="{FF2B5EF4-FFF2-40B4-BE49-F238E27FC236}">
-                <a16:creationId xmlns:a16="http://schemas.microsoft.com/office/drawing/2014/main" id="{BDAD93E9-1E73-47DA-BAA3-6645AE039A64}"/>
+                <a16:creationId xmlns:a16="http://schemas.microsoft.com/office/drawing/2014/main" id="{88606571-E834-4461-9608-E9CD7B9D12C3}"/>
               </a:ext>
             </a:extLst>
           </p:cNvPr>
@@ -8251,7 +8529,7 @@
           <a:p>
             <a:r>
               <a:rPr lang="hu-HU" dirty="0"/>
-              <a:t>Skálázhatóság</a:t>
+              <a:t>Átlátszóság</a:t>
             </a:r>
           </a:p>
         </p:txBody>
@@ -8261,7 +8539,7 @@
           <p:cNvPr id="3" name="Tartalom helye 2">
             <a:extLst>
               <a:ext uri="{FF2B5EF4-FFF2-40B4-BE49-F238E27FC236}">
-                <a16:creationId xmlns:a16="http://schemas.microsoft.com/office/drawing/2014/main" id="{9707FFEA-63A1-4239-9276-E8A78D96CD48}"/>
+                <a16:creationId xmlns:a16="http://schemas.microsoft.com/office/drawing/2014/main" id="{B722AC36-A9B7-46F2-9DA5-44CAEEC6CD18}"/>
               </a:ext>
             </a:extLst>
           </p:cNvPr>
@@ -8279,19 +8557,44 @@
           <a:p>
             <a:r>
               <a:rPr lang="hu-HU" dirty="0"/>
-              <a:t>Méretbeli</a:t>
-            </a:r>
-          </a:p>
-          <a:p>
-            <a:r>
-              <a:rPr lang="hu-HU" dirty="0"/>
-              <a:t>Földrajzi</a:t>
-            </a:r>
-          </a:p>
-          <a:p>
-            <a:r>
-              <a:rPr lang="hu-HU" dirty="0"/>
-              <a:t>Adminisztratív</a:t>
+              <a:t>Hozzáférés</a:t>
+            </a:r>
+          </a:p>
+          <a:p>
+            <a:r>
+              <a:rPr lang="hu-HU" dirty="0"/>
+              <a:t>Hely elfedése</a:t>
+            </a:r>
+          </a:p>
+          <a:p>
+            <a:r>
+              <a:rPr lang="hu-HU" dirty="0"/>
+              <a:t>Mozgatás</a:t>
+            </a:r>
+          </a:p>
+          <a:p>
+            <a:r>
+              <a:rPr lang="hu-HU" dirty="0" err="1"/>
+              <a:t>Relokáció</a:t>
+            </a:r>
+            <a:endParaRPr lang="hu-HU" dirty="0"/>
+          </a:p>
+          <a:p>
+            <a:r>
+              <a:rPr lang="hu-HU" dirty="0"/>
+              <a:t>Replikáció</a:t>
+            </a:r>
+          </a:p>
+          <a:p>
+            <a:r>
+              <a:rPr lang="hu-HU" dirty="0"/>
+              <a:t>Konkurencia</a:t>
+            </a:r>
+          </a:p>
+          <a:p>
+            <a:r>
+              <a:rPr lang="hu-HU" dirty="0"/>
+              <a:t>Hibatűrés</a:t>
             </a:r>
           </a:p>
         </p:txBody>
@@ -8299,7 +8602,7 @@
     </p:spTree>
     <p:extLst>
       <p:ext uri="{BB962C8B-B14F-4D97-AF65-F5344CB8AC3E}">
-        <p14:creationId xmlns:p14="http://schemas.microsoft.com/office/powerpoint/2010/main" val="4174636521"/>
+        <p14:creationId xmlns:p14="http://schemas.microsoft.com/office/powerpoint/2010/main" val="3650026717"/>
       </p:ext>
     </p:extLst>
   </p:cSld>
@@ -8445,8 +8748,8 @@
               <a:t>Monolitikus rendszerek szemben </a:t>
             </a:r>
             <a:r>
-              <a:rPr lang="hu-HU" dirty="0" err="1"/>
-              <a:t>mikroszervíz</a:t>
+              <a:rPr lang="hu-HU"/>
+              <a:t>mikroszerviz</a:t>
             </a:r>
             <a:r>
               <a:rPr lang="hu-HU" dirty="0"/>
@@ -8514,6 +8817,220 @@
           <p:cNvPr id="2" name="Cím 1">
             <a:extLst>
               <a:ext uri="{FF2B5EF4-FFF2-40B4-BE49-F238E27FC236}">
+                <a16:creationId xmlns:a16="http://schemas.microsoft.com/office/drawing/2014/main" id="{63BDAA71-EB16-4DF6-A996-1880DC7DAB52}"/>
+              </a:ext>
+            </a:extLst>
+          </p:cNvPr>
+          <p:cNvSpPr>
+            <a:spLocks noGrp="1"/>
+          </p:cNvSpPr>
+          <p:nvPr>
+            <p:ph type="title"/>
+          </p:nvPr>
+        </p:nvSpPr>
+        <p:spPr/>
+        <p:txBody>
+          <a:bodyPr/>
+          <a:lstStyle/>
+          <a:p>
+            <a:r>
+              <a:rPr lang="hu-HU" dirty="0"/>
+              <a:t>Nyíltság</a:t>
+            </a:r>
+          </a:p>
+        </p:txBody>
+      </p:sp>
+      <p:sp>
+        <p:nvSpPr>
+          <p:cNvPr id="3" name="Tartalom helye 2">
+            <a:extLst>
+              <a:ext uri="{FF2B5EF4-FFF2-40B4-BE49-F238E27FC236}">
+                <a16:creationId xmlns:a16="http://schemas.microsoft.com/office/drawing/2014/main" id="{064CAF0D-A507-4AF7-837C-E9C64C324E72}"/>
+              </a:ext>
+            </a:extLst>
+          </p:cNvPr>
+          <p:cNvSpPr>
+            <a:spLocks noGrp="1"/>
+          </p:cNvSpPr>
+          <p:nvPr>
+            <p:ph idx="1"/>
+          </p:nvPr>
+        </p:nvSpPr>
+        <p:spPr/>
+        <p:txBody>
+          <a:bodyPr/>
+          <a:lstStyle/>
+          <a:p>
+            <a:r>
+              <a:rPr lang="hu-HU" dirty="0"/>
+              <a:t>Programnyelv</a:t>
+            </a:r>
+          </a:p>
+          <a:p>
+            <a:pPr lvl="1"/>
+            <a:r>
+              <a:rPr lang="hu-HU" dirty="0"/>
+              <a:t>Teljesség</a:t>
+            </a:r>
+          </a:p>
+          <a:p>
+            <a:pPr lvl="1"/>
+            <a:r>
+              <a:rPr lang="hu-HU" dirty="0"/>
+              <a:t>Semlegesség</a:t>
+            </a:r>
+          </a:p>
+          <a:p>
+            <a:pPr lvl="1"/>
+            <a:endParaRPr lang="hu-HU" dirty="0"/>
+          </a:p>
+          <a:p>
+            <a:r>
+              <a:rPr lang="hu-HU" dirty="0"/>
+              <a:t>Hordozhatóság</a:t>
+            </a:r>
+          </a:p>
+          <a:p>
+            <a:r>
+              <a:rPr lang="hu-HU" dirty="0"/>
+              <a:t>Műveletek közötti átjárhatóság</a:t>
+            </a:r>
+          </a:p>
+        </p:txBody>
+      </p:sp>
+    </p:spTree>
+    <p:extLst>
+      <p:ext uri="{BB962C8B-B14F-4D97-AF65-F5344CB8AC3E}">
+        <p14:creationId xmlns:p14="http://schemas.microsoft.com/office/powerpoint/2010/main" val="663386619"/>
+      </p:ext>
+    </p:extLst>
+  </p:cSld>
+  <p:clrMapOvr>
+    <a:masterClrMapping/>
+  </p:clrMapOvr>
+</p:sld>
+</file>
+
+<file path=ppt/slides/slide21.xml><?xml version="1.0" encoding="utf-8"?>
+<p:sld xmlns:a="http://schemas.openxmlformats.org/drawingml/2006/main" xmlns:r="http://schemas.openxmlformats.org/officeDocument/2006/relationships" xmlns:p="http://schemas.openxmlformats.org/presentationml/2006/main">
+  <p:cSld>
+    <p:spTree>
+      <p:nvGrpSpPr>
+        <p:cNvPr id="1" name=""/>
+        <p:cNvGrpSpPr/>
+        <p:nvPr/>
+      </p:nvGrpSpPr>
+      <p:grpSpPr>
+        <a:xfrm>
+          <a:off x="0" y="0"/>
+          <a:ext cx="0" cy="0"/>
+          <a:chOff x="0" y="0"/>
+          <a:chExt cx="0" cy="0"/>
+        </a:xfrm>
+      </p:grpSpPr>
+      <p:sp>
+        <p:nvSpPr>
+          <p:cNvPr id="2" name="Cím 1">
+            <a:extLst>
+              <a:ext uri="{FF2B5EF4-FFF2-40B4-BE49-F238E27FC236}">
+                <a16:creationId xmlns:a16="http://schemas.microsoft.com/office/drawing/2014/main" id="{BDAD93E9-1E73-47DA-BAA3-6645AE039A64}"/>
+              </a:ext>
+            </a:extLst>
+          </p:cNvPr>
+          <p:cNvSpPr>
+            <a:spLocks noGrp="1"/>
+          </p:cNvSpPr>
+          <p:nvPr>
+            <p:ph type="title"/>
+          </p:nvPr>
+        </p:nvSpPr>
+        <p:spPr/>
+        <p:txBody>
+          <a:bodyPr/>
+          <a:lstStyle/>
+          <a:p>
+            <a:r>
+              <a:rPr lang="hu-HU" dirty="0"/>
+              <a:t>Skálázhatóság</a:t>
+            </a:r>
+          </a:p>
+        </p:txBody>
+      </p:sp>
+      <p:sp>
+        <p:nvSpPr>
+          <p:cNvPr id="3" name="Tartalom helye 2">
+            <a:extLst>
+              <a:ext uri="{FF2B5EF4-FFF2-40B4-BE49-F238E27FC236}">
+                <a16:creationId xmlns:a16="http://schemas.microsoft.com/office/drawing/2014/main" id="{9707FFEA-63A1-4239-9276-E8A78D96CD48}"/>
+              </a:ext>
+            </a:extLst>
+          </p:cNvPr>
+          <p:cNvSpPr>
+            <a:spLocks noGrp="1"/>
+          </p:cNvSpPr>
+          <p:nvPr>
+            <p:ph idx="1"/>
+          </p:nvPr>
+        </p:nvSpPr>
+        <p:spPr/>
+        <p:txBody>
+          <a:bodyPr/>
+          <a:lstStyle/>
+          <a:p>
+            <a:r>
+              <a:rPr lang="hu-HU" dirty="0"/>
+              <a:t>Méretbeli</a:t>
+            </a:r>
+          </a:p>
+          <a:p>
+            <a:r>
+              <a:rPr lang="hu-HU" dirty="0"/>
+              <a:t>Földrajzi</a:t>
+            </a:r>
+          </a:p>
+          <a:p>
+            <a:r>
+              <a:rPr lang="hu-HU" dirty="0"/>
+              <a:t>Adminisztratív</a:t>
+            </a:r>
+          </a:p>
+        </p:txBody>
+      </p:sp>
+    </p:spTree>
+    <p:extLst>
+      <p:ext uri="{BB962C8B-B14F-4D97-AF65-F5344CB8AC3E}">
+        <p14:creationId xmlns:p14="http://schemas.microsoft.com/office/powerpoint/2010/main" val="4174636521"/>
+      </p:ext>
+    </p:extLst>
+  </p:cSld>
+  <p:clrMapOvr>
+    <a:masterClrMapping/>
+  </p:clrMapOvr>
+</p:sld>
+</file>
+
+<file path=ppt/slides/slide22.xml><?xml version="1.0" encoding="utf-8"?>
+<p:sld xmlns:a="http://schemas.openxmlformats.org/drawingml/2006/main" xmlns:r="http://schemas.openxmlformats.org/officeDocument/2006/relationships" xmlns:p="http://schemas.openxmlformats.org/presentationml/2006/main">
+  <p:cSld>
+    <p:spTree>
+      <p:nvGrpSpPr>
+        <p:cNvPr id="1" name=""/>
+        <p:cNvGrpSpPr/>
+        <p:nvPr/>
+      </p:nvGrpSpPr>
+      <p:grpSpPr>
+        <a:xfrm>
+          <a:off x="0" y="0"/>
+          <a:ext cx="0" cy="0"/>
+          <a:chOff x="0" y="0"/>
+          <a:chExt cx="0" cy="0"/>
+        </a:xfrm>
+      </p:grpSpPr>
+      <p:sp>
+        <p:nvSpPr>
+          <p:cNvPr id="2" name="Cím 1">
+            <a:extLst>
+              <a:ext uri="{FF2B5EF4-FFF2-40B4-BE49-F238E27FC236}">
                 <a16:creationId xmlns:a16="http://schemas.microsoft.com/office/drawing/2014/main" id="{296165D0-24CB-46F8-8F76-25F81A7585DB}"/>
               </a:ext>
             </a:extLst>
@@ -8590,7 +9107,7 @@
 </p:sld>
 </file>
 
-<file path=ppt/slides/slide21.xml><?xml version="1.0" encoding="utf-8"?>
+<file path=ppt/slides/slide23.xml><?xml version="1.0" encoding="utf-8"?>
 <p:sld xmlns:a="http://schemas.openxmlformats.org/drawingml/2006/main" xmlns:r="http://schemas.openxmlformats.org/officeDocument/2006/relationships" xmlns:p="http://schemas.openxmlformats.org/presentationml/2006/main">
   <p:cSld>
     <p:spTree>
@@ -8680,215 +9197,6 @@
 </p:sld>
 </file>
 
-<file path=ppt/slides/slide22.xml><?xml version="1.0" encoding="utf-8"?>
-<p:sld xmlns:a="http://schemas.openxmlformats.org/drawingml/2006/main" xmlns:r="http://schemas.openxmlformats.org/officeDocument/2006/relationships" xmlns:p="http://schemas.openxmlformats.org/presentationml/2006/main">
-  <p:cSld>
-    <p:spTree>
-      <p:nvGrpSpPr>
-        <p:cNvPr id="1" name=""/>
-        <p:cNvGrpSpPr/>
-        <p:nvPr/>
-      </p:nvGrpSpPr>
-      <p:grpSpPr>
-        <a:xfrm>
-          <a:off x="0" y="0"/>
-          <a:ext cx="0" cy="0"/>
-          <a:chOff x="0" y="0"/>
-          <a:chExt cx="0" cy="0"/>
-        </a:xfrm>
-      </p:grpSpPr>
-      <p:sp>
-        <p:nvSpPr>
-          <p:cNvPr id="2" name="Cím 1">
-            <a:extLst>
-              <a:ext uri="{FF2B5EF4-FFF2-40B4-BE49-F238E27FC236}">
-                <a16:creationId xmlns:a16="http://schemas.microsoft.com/office/drawing/2014/main" id="{833CA029-2B06-4A93-88EC-0D64C454D895}"/>
-              </a:ext>
-            </a:extLst>
-          </p:cNvPr>
-          <p:cNvSpPr>
-            <a:spLocks noGrp="1"/>
-          </p:cNvSpPr>
-          <p:nvPr>
-            <p:ph type="title"/>
-          </p:nvPr>
-        </p:nvSpPr>
-        <p:spPr/>
-        <p:txBody>
-          <a:bodyPr/>
-          <a:lstStyle/>
-          <a:p>
-            <a:r>
-              <a:rPr lang="hu-HU" dirty="0"/>
-              <a:t>Elosztott információs rendszerek: tranzakciók</a:t>
-            </a:r>
-          </a:p>
-        </p:txBody>
-      </p:sp>
-      <p:sp>
-        <p:nvSpPr>
-          <p:cNvPr id="3" name="Tartalom helye 2">
-            <a:extLst>
-              <a:ext uri="{FF2B5EF4-FFF2-40B4-BE49-F238E27FC236}">
-                <a16:creationId xmlns:a16="http://schemas.microsoft.com/office/drawing/2014/main" id="{E77598C3-A215-460E-99BD-F3AA66E3BEF1}"/>
-              </a:ext>
-            </a:extLst>
-          </p:cNvPr>
-          <p:cNvSpPr>
-            <a:spLocks noGrp="1"/>
-          </p:cNvSpPr>
-          <p:nvPr>
-            <p:ph idx="1"/>
-          </p:nvPr>
-        </p:nvSpPr>
-        <p:spPr/>
-        <p:txBody>
-          <a:bodyPr/>
-          <a:lstStyle/>
-          <a:p>
-            <a:r>
-              <a:rPr lang="hu-HU" dirty="0"/>
-              <a:t>Modell</a:t>
-            </a:r>
-          </a:p>
-          <a:p>
-            <a:r>
-              <a:rPr lang="hu-HU" dirty="0" err="1"/>
-              <a:t>Atomosság</a:t>
-            </a:r>
-            <a:endParaRPr lang="hu-HU" dirty="0"/>
-          </a:p>
-          <a:p>
-            <a:r>
-              <a:rPr lang="hu-HU" dirty="0"/>
-              <a:t>Konzisztencia</a:t>
-            </a:r>
-          </a:p>
-          <a:p>
-            <a:r>
-              <a:rPr lang="hu-HU" dirty="0"/>
-              <a:t>Elkülönítés</a:t>
-            </a:r>
-          </a:p>
-          <a:p>
-            <a:r>
-              <a:rPr lang="hu-HU" dirty="0"/>
-              <a:t>Tartósság</a:t>
-            </a:r>
-          </a:p>
-        </p:txBody>
-      </p:sp>
-    </p:spTree>
-    <p:extLst>
-      <p:ext uri="{BB962C8B-B14F-4D97-AF65-F5344CB8AC3E}">
-        <p14:creationId xmlns:p14="http://schemas.microsoft.com/office/powerpoint/2010/main" val="3120922148"/>
-      </p:ext>
-    </p:extLst>
-  </p:cSld>
-  <p:clrMapOvr>
-    <a:masterClrMapping/>
-  </p:clrMapOvr>
-</p:sld>
-</file>
-
-<file path=ppt/slides/slide23.xml><?xml version="1.0" encoding="utf-8"?>
-<p:sld xmlns:a="http://schemas.openxmlformats.org/drawingml/2006/main" xmlns:r="http://schemas.openxmlformats.org/officeDocument/2006/relationships" xmlns:p="http://schemas.openxmlformats.org/presentationml/2006/main">
-  <p:cSld>
-    <p:spTree>
-      <p:nvGrpSpPr>
-        <p:cNvPr id="1" name=""/>
-        <p:cNvGrpSpPr/>
-        <p:nvPr/>
-      </p:nvGrpSpPr>
-      <p:grpSpPr>
-        <a:xfrm>
-          <a:off x="0" y="0"/>
-          <a:ext cx="0" cy="0"/>
-          <a:chOff x="0" y="0"/>
-          <a:chExt cx="0" cy="0"/>
-        </a:xfrm>
-      </p:grpSpPr>
-      <p:sp>
-        <p:nvSpPr>
-          <p:cNvPr id="2" name="Cím 1">
-            <a:extLst>
-              <a:ext uri="{FF2B5EF4-FFF2-40B4-BE49-F238E27FC236}">
-                <a16:creationId xmlns:a16="http://schemas.microsoft.com/office/drawing/2014/main" id="{187342FE-3DAD-4ED6-982D-A4D15C329608}"/>
-              </a:ext>
-            </a:extLst>
-          </p:cNvPr>
-          <p:cNvSpPr>
-            <a:spLocks noGrp="1"/>
-          </p:cNvSpPr>
-          <p:nvPr>
-            <p:ph type="title"/>
-          </p:nvPr>
-        </p:nvSpPr>
-        <p:spPr/>
-        <p:txBody>
-          <a:bodyPr/>
-          <a:lstStyle/>
-          <a:p>
-            <a:r>
-              <a:rPr lang="hu-HU" dirty="0"/>
-              <a:t>Elosztott elterjedt rendszerek</a:t>
-            </a:r>
-          </a:p>
-        </p:txBody>
-      </p:sp>
-      <p:sp>
-        <p:nvSpPr>
-          <p:cNvPr id="3" name="Tartalom helye 2">
-            <a:extLst>
-              <a:ext uri="{FF2B5EF4-FFF2-40B4-BE49-F238E27FC236}">
-                <a16:creationId xmlns:a16="http://schemas.microsoft.com/office/drawing/2014/main" id="{72C212C5-2BCC-435D-A620-994AC3A765BA}"/>
-              </a:ext>
-            </a:extLst>
-          </p:cNvPr>
-          <p:cNvSpPr>
-            <a:spLocks noGrp="1"/>
-          </p:cNvSpPr>
-          <p:nvPr>
-            <p:ph idx="1"/>
-          </p:nvPr>
-        </p:nvSpPr>
-        <p:spPr/>
-        <p:txBody>
-          <a:bodyPr/>
-          <a:lstStyle/>
-          <a:p>
-            <a:r>
-              <a:rPr lang="hu-HU" dirty="0"/>
-              <a:t>Kontextuális változás</a:t>
-            </a:r>
-          </a:p>
-          <a:p>
-            <a:r>
-              <a:rPr lang="hu-HU" dirty="0"/>
-              <a:t>Ad hoc összetétel</a:t>
-            </a:r>
-          </a:p>
-          <a:p>
-            <a:r>
-              <a:rPr lang="hu-HU" dirty="0"/>
-              <a:t>A megosztás az alapértelmezett</a:t>
-            </a:r>
-          </a:p>
-        </p:txBody>
-      </p:sp>
-    </p:spTree>
-    <p:extLst>
-      <p:ext uri="{BB962C8B-B14F-4D97-AF65-F5344CB8AC3E}">
-        <p14:creationId xmlns:p14="http://schemas.microsoft.com/office/powerpoint/2010/main" val="1687631970"/>
-      </p:ext>
-    </p:extLst>
-  </p:cSld>
-  <p:clrMapOvr>
-    <a:masterClrMapping/>
-  </p:clrMapOvr>
-</p:sld>
-</file>
-
 <file path=ppt/slides/slide24.xml><?xml version="1.0" encoding="utf-8"?>
 <p:sld xmlns:a="http://schemas.openxmlformats.org/drawingml/2006/main" xmlns:r="http://schemas.openxmlformats.org/officeDocument/2006/relationships" xmlns:p="http://schemas.openxmlformats.org/presentationml/2006/main">
   <p:cSld>
@@ -8911,7 +9219,7 @@
           <p:cNvPr id="2" name="Cím 1">
             <a:extLst>
               <a:ext uri="{FF2B5EF4-FFF2-40B4-BE49-F238E27FC236}">
-                <a16:creationId xmlns:a16="http://schemas.microsoft.com/office/drawing/2014/main" id="{7442CE72-EE7D-407B-85F0-6A073EBD4443}"/>
+                <a16:creationId xmlns:a16="http://schemas.microsoft.com/office/drawing/2014/main" id="{833CA029-2B06-4A93-88EC-0D64C454D895}"/>
               </a:ext>
             </a:extLst>
           </p:cNvPr>
@@ -8928,45 +9236,69 @@
           <a:lstStyle/>
           <a:p>
             <a:r>
+              <a:rPr lang="hu-HU" dirty="0"/>
+              <a:t>Elosztott információs rendszerek: tranzakciók</a:t>
+            </a:r>
+          </a:p>
+        </p:txBody>
+      </p:sp>
+      <p:sp>
+        <p:nvSpPr>
+          <p:cNvPr id="3" name="Tartalom helye 2">
+            <a:extLst>
+              <a:ext uri="{FF2B5EF4-FFF2-40B4-BE49-F238E27FC236}">
+                <a16:creationId xmlns:a16="http://schemas.microsoft.com/office/drawing/2014/main" id="{E77598C3-A215-460E-99BD-F3AA66E3BEF1}"/>
+              </a:ext>
+            </a:extLst>
+          </p:cNvPr>
+          <p:cNvSpPr>
+            <a:spLocks noGrp="1"/>
+          </p:cNvSpPr>
+          <p:nvPr>
+            <p:ph idx="1"/>
+          </p:nvPr>
+        </p:nvSpPr>
+        <p:spPr/>
+        <p:txBody>
+          <a:bodyPr/>
+          <a:lstStyle/>
+          <a:p>
+            <a:r>
+              <a:rPr lang="hu-HU" dirty="0"/>
+              <a:t>Modell</a:t>
+            </a:r>
+          </a:p>
+          <a:p>
+            <a:r>
               <a:rPr lang="hu-HU" dirty="0" err="1"/>
-              <a:t>Singleton</a:t>
-            </a:r>
-            <a:r>
-              <a:rPr lang="hu-HU" dirty="0"/>
-              <a:t> (egyke)</a:t>
-            </a:r>
-          </a:p>
-        </p:txBody>
-      </p:sp>
-      <p:sp>
-        <p:nvSpPr>
-          <p:cNvPr id="3" name="Tartalom helye 2">
-            <a:extLst>
-              <a:ext uri="{FF2B5EF4-FFF2-40B4-BE49-F238E27FC236}">
-                <a16:creationId xmlns:a16="http://schemas.microsoft.com/office/drawing/2014/main" id="{058A94DF-818C-4D99-A173-0CF48C69A363}"/>
-              </a:ext>
-            </a:extLst>
-          </p:cNvPr>
-          <p:cNvSpPr>
-            <a:spLocks noGrp="1"/>
-          </p:cNvSpPr>
-          <p:nvPr>
-            <p:ph idx="1"/>
-          </p:nvPr>
-        </p:nvSpPr>
-        <p:spPr/>
-        <p:txBody>
-          <a:bodyPr/>
-          <a:lstStyle/>
-          <a:p>
+              <a:t>Atomosság</a:t>
+            </a:r>
             <a:endParaRPr lang="hu-HU" dirty="0"/>
+          </a:p>
+          <a:p>
+            <a:r>
+              <a:rPr lang="hu-HU" dirty="0"/>
+              <a:t>Konzisztencia</a:t>
+            </a:r>
+          </a:p>
+          <a:p>
+            <a:r>
+              <a:rPr lang="hu-HU" dirty="0"/>
+              <a:t>Elkülönítés</a:t>
+            </a:r>
+          </a:p>
+          <a:p>
+            <a:r>
+              <a:rPr lang="hu-HU" dirty="0"/>
+              <a:t>Tartósság</a:t>
+            </a:r>
           </a:p>
         </p:txBody>
       </p:sp>
     </p:spTree>
     <p:extLst>
       <p:ext uri="{BB962C8B-B14F-4D97-AF65-F5344CB8AC3E}">
-        <p14:creationId xmlns:p14="http://schemas.microsoft.com/office/powerpoint/2010/main" val="286922289"/>
+        <p14:creationId xmlns:p14="http://schemas.microsoft.com/office/powerpoint/2010/main" val="3120922148"/>
       </p:ext>
     </p:extLst>
   </p:cSld>
@@ -8977,6 +9309,372 @@
 </file>
 
 <file path=ppt/slides/slide25.xml><?xml version="1.0" encoding="utf-8"?>
+<p:sld xmlns:a="http://schemas.openxmlformats.org/drawingml/2006/main" xmlns:r="http://schemas.openxmlformats.org/officeDocument/2006/relationships" xmlns:p="http://schemas.openxmlformats.org/presentationml/2006/main">
+  <p:cSld>
+    <p:spTree>
+      <p:nvGrpSpPr>
+        <p:cNvPr id="1" name=""/>
+        <p:cNvGrpSpPr/>
+        <p:nvPr/>
+      </p:nvGrpSpPr>
+      <p:grpSpPr>
+        <a:xfrm>
+          <a:off x="0" y="0"/>
+          <a:ext cx="0" cy="0"/>
+          <a:chOff x="0" y="0"/>
+          <a:chExt cx="0" cy="0"/>
+        </a:xfrm>
+      </p:grpSpPr>
+      <p:sp>
+        <p:nvSpPr>
+          <p:cNvPr id="2" name="Cím 1">
+            <a:extLst>
+              <a:ext uri="{FF2B5EF4-FFF2-40B4-BE49-F238E27FC236}">
+                <a16:creationId xmlns:a16="http://schemas.microsoft.com/office/drawing/2014/main" id="{187342FE-3DAD-4ED6-982D-A4D15C329608}"/>
+              </a:ext>
+            </a:extLst>
+          </p:cNvPr>
+          <p:cNvSpPr>
+            <a:spLocks noGrp="1"/>
+          </p:cNvSpPr>
+          <p:nvPr>
+            <p:ph type="title"/>
+          </p:nvPr>
+        </p:nvSpPr>
+        <p:spPr/>
+        <p:txBody>
+          <a:bodyPr/>
+          <a:lstStyle/>
+          <a:p>
+            <a:r>
+              <a:rPr lang="hu-HU" dirty="0"/>
+              <a:t>Elosztott elterjedt rendszerek</a:t>
+            </a:r>
+          </a:p>
+        </p:txBody>
+      </p:sp>
+      <p:sp>
+        <p:nvSpPr>
+          <p:cNvPr id="3" name="Tartalom helye 2">
+            <a:extLst>
+              <a:ext uri="{FF2B5EF4-FFF2-40B4-BE49-F238E27FC236}">
+                <a16:creationId xmlns:a16="http://schemas.microsoft.com/office/drawing/2014/main" id="{72C212C5-2BCC-435D-A620-994AC3A765BA}"/>
+              </a:ext>
+            </a:extLst>
+          </p:cNvPr>
+          <p:cNvSpPr>
+            <a:spLocks noGrp="1"/>
+          </p:cNvSpPr>
+          <p:nvPr>
+            <p:ph idx="1"/>
+          </p:nvPr>
+        </p:nvSpPr>
+        <p:spPr/>
+        <p:txBody>
+          <a:bodyPr/>
+          <a:lstStyle/>
+          <a:p>
+            <a:r>
+              <a:rPr lang="hu-HU" dirty="0"/>
+              <a:t>Kontextuális változás</a:t>
+            </a:r>
+          </a:p>
+          <a:p>
+            <a:r>
+              <a:rPr lang="hu-HU" dirty="0"/>
+              <a:t>Ad hoc összetétel</a:t>
+            </a:r>
+          </a:p>
+          <a:p>
+            <a:r>
+              <a:rPr lang="hu-HU" dirty="0"/>
+              <a:t>A megosztás az alapértelmezett</a:t>
+            </a:r>
+          </a:p>
+        </p:txBody>
+      </p:sp>
+    </p:spTree>
+    <p:extLst>
+      <p:ext uri="{BB962C8B-B14F-4D97-AF65-F5344CB8AC3E}">
+        <p14:creationId xmlns:p14="http://schemas.microsoft.com/office/powerpoint/2010/main" val="1687631970"/>
+      </p:ext>
+    </p:extLst>
+  </p:cSld>
+  <p:clrMapOvr>
+    <a:masterClrMapping/>
+  </p:clrMapOvr>
+</p:sld>
+</file>
+
+<file path=ppt/slides/slide26.xml><?xml version="1.0" encoding="utf-8"?>
+<p:sld xmlns:a="http://schemas.openxmlformats.org/drawingml/2006/main" xmlns:r="http://schemas.openxmlformats.org/officeDocument/2006/relationships" xmlns:p="http://schemas.openxmlformats.org/presentationml/2006/main">
+  <p:cSld>
+    <p:spTree>
+      <p:nvGrpSpPr>
+        <p:cNvPr id="1" name=""/>
+        <p:cNvGrpSpPr/>
+        <p:nvPr/>
+      </p:nvGrpSpPr>
+      <p:grpSpPr>
+        <a:xfrm>
+          <a:off x="0" y="0"/>
+          <a:ext cx="0" cy="0"/>
+          <a:chOff x="0" y="0"/>
+          <a:chExt cx="0" cy="0"/>
+        </a:xfrm>
+      </p:grpSpPr>
+      <p:sp>
+        <p:nvSpPr>
+          <p:cNvPr id="2" name="Cím 1">
+            <a:extLst>
+              <a:ext uri="{FF2B5EF4-FFF2-40B4-BE49-F238E27FC236}">
+                <a16:creationId xmlns:a16="http://schemas.microsoft.com/office/drawing/2014/main" id="{7C55B645-B7C8-429F-9AAF-575B1DD4E213}"/>
+              </a:ext>
+            </a:extLst>
+          </p:cNvPr>
+          <p:cNvSpPr>
+            <a:spLocks noGrp="1"/>
+          </p:cNvSpPr>
+          <p:nvPr>
+            <p:ph type="title"/>
+          </p:nvPr>
+        </p:nvSpPr>
+        <p:spPr/>
+        <p:txBody>
+          <a:bodyPr/>
+          <a:lstStyle/>
+          <a:p>
+            <a:r>
+              <a:rPr lang="hu-HU" dirty="0"/>
+              <a:t>Microsoft </a:t>
+            </a:r>
+            <a:r>
+              <a:rPr lang="hu-HU" dirty="0" err="1"/>
+              <a:t>Azure</a:t>
+            </a:r>
+            <a:endParaRPr lang="hu-HU" dirty="0"/>
+          </a:p>
+        </p:txBody>
+      </p:sp>
+      <p:sp>
+        <p:nvSpPr>
+          <p:cNvPr id="3" name="Tartalom helye 2">
+            <a:extLst>
+              <a:ext uri="{FF2B5EF4-FFF2-40B4-BE49-F238E27FC236}">
+                <a16:creationId xmlns:a16="http://schemas.microsoft.com/office/drawing/2014/main" id="{BF54DBAE-A2E4-4797-B2D0-7D81483081C2}"/>
+              </a:ext>
+            </a:extLst>
+          </p:cNvPr>
+          <p:cNvSpPr>
+            <a:spLocks noGrp="1"/>
+          </p:cNvSpPr>
+          <p:nvPr>
+            <p:ph idx="1"/>
+          </p:nvPr>
+        </p:nvSpPr>
+        <p:spPr/>
+        <p:txBody>
+          <a:bodyPr/>
+          <a:lstStyle/>
+          <a:p>
+            <a:r>
+              <a:rPr lang="hu-HU" dirty="0"/>
+              <a:t>Alkalmazások </a:t>
+            </a:r>
+          </a:p>
+          <a:p>
+            <a:pPr lvl="1"/>
+            <a:r>
+              <a:rPr lang="hu-HU" dirty="0"/>
+              <a:t>Készítése</a:t>
+            </a:r>
+          </a:p>
+          <a:p>
+            <a:pPr lvl="1"/>
+            <a:r>
+              <a:rPr lang="hu-HU" dirty="0"/>
+              <a:t>Telepítése</a:t>
+            </a:r>
+          </a:p>
+          <a:p>
+            <a:pPr lvl="1"/>
+            <a:r>
+              <a:rPr lang="hu-HU" dirty="0"/>
+              <a:t>Futtatása</a:t>
+            </a:r>
+          </a:p>
+          <a:p>
+            <a:r>
+              <a:rPr lang="hu-HU" dirty="0"/>
+              <a:t>Tetszőleges .NET alapú alkalmazások támogatása</a:t>
+            </a:r>
+          </a:p>
+        </p:txBody>
+      </p:sp>
+    </p:spTree>
+    <p:extLst>
+      <p:ext uri="{BB962C8B-B14F-4D97-AF65-F5344CB8AC3E}">
+        <p14:creationId xmlns:p14="http://schemas.microsoft.com/office/powerpoint/2010/main" val="3034115016"/>
+      </p:ext>
+    </p:extLst>
+  </p:cSld>
+  <p:clrMapOvr>
+    <a:masterClrMapping/>
+  </p:clrMapOvr>
+</p:sld>
+</file>
+
+<file path=ppt/slides/slide27.xml><?xml version="1.0" encoding="utf-8"?>
+<p:sld xmlns:a="http://schemas.openxmlformats.org/drawingml/2006/main" xmlns:r="http://schemas.openxmlformats.org/officeDocument/2006/relationships" xmlns:p="http://schemas.openxmlformats.org/presentationml/2006/main">
+  <p:cSld>
+    <p:spTree>
+      <p:nvGrpSpPr>
+        <p:cNvPr id="1" name=""/>
+        <p:cNvGrpSpPr/>
+        <p:nvPr/>
+      </p:nvGrpSpPr>
+      <p:grpSpPr>
+        <a:xfrm>
+          <a:off x="0" y="0"/>
+          <a:ext cx="0" cy="0"/>
+          <a:chOff x="0" y="0"/>
+          <a:chExt cx="0" cy="0"/>
+        </a:xfrm>
+      </p:grpSpPr>
+      <p:sp>
+        <p:nvSpPr>
+          <p:cNvPr id="2" name="Cím 1">
+            <a:extLst>
+              <a:ext uri="{FF2B5EF4-FFF2-40B4-BE49-F238E27FC236}">
+                <a16:creationId xmlns:a16="http://schemas.microsoft.com/office/drawing/2014/main" id="{5BFDB839-7368-481C-8DE7-F365E533CD1E}"/>
+              </a:ext>
+            </a:extLst>
+          </p:cNvPr>
+          <p:cNvSpPr>
+            <a:spLocks noGrp="1"/>
+          </p:cNvSpPr>
+          <p:nvPr>
+            <p:ph type="title"/>
+          </p:nvPr>
+        </p:nvSpPr>
+        <p:spPr/>
+        <p:txBody>
+          <a:bodyPr/>
+          <a:lstStyle/>
+          <a:p>
+            <a:r>
+              <a:rPr lang="hu-HU" dirty="0"/>
+              <a:t>Microsoft </a:t>
+            </a:r>
+            <a:r>
+              <a:rPr lang="hu-HU" dirty="0" err="1"/>
+              <a:t>Azure</a:t>
+            </a:r>
+            <a:r>
+              <a:rPr lang="hu-HU" dirty="0"/>
+              <a:t> szolgáltatásai</a:t>
+            </a:r>
+          </a:p>
+        </p:txBody>
+      </p:sp>
+      <p:sp>
+        <p:nvSpPr>
+          <p:cNvPr id="3" name="Tartalom helye 2">
+            <a:extLst>
+              <a:ext uri="{FF2B5EF4-FFF2-40B4-BE49-F238E27FC236}">
+                <a16:creationId xmlns:a16="http://schemas.microsoft.com/office/drawing/2014/main" id="{DDC12253-73F2-4819-8BB5-3B546E1C2D2E}"/>
+              </a:ext>
+            </a:extLst>
+          </p:cNvPr>
+          <p:cNvSpPr>
+            <a:spLocks noGrp="1"/>
+          </p:cNvSpPr>
+          <p:nvPr>
+            <p:ph idx="1"/>
+          </p:nvPr>
+        </p:nvSpPr>
+        <p:spPr/>
+        <p:txBody>
+          <a:bodyPr>
+            <a:normAutofit fontScale="92500" lnSpcReduction="20000"/>
+          </a:bodyPr>
+          <a:lstStyle/>
+          <a:p>
+            <a:r>
+              <a:rPr lang="hu-HU" dirty="0"/>
+              <a:t>Számítások</a:t>
+            </a:r>
+          </a:p>
+          <a:p>
+            <a:r>
+              <a:rPr lang="hu-HU" dirty="0"/>
+              <a:t>Mobil szolgáltatások</a:t>
+            </a:r>
+          </a:p>
+          <a:p>
+            <a:r>
+              <a:rPr lang="hu-HU" dirty="0"/>
+              <a:t>Tárolás</a:t>
+            </a:r>
+          </a:p>
+          <a:p>
+            <a:r>
+              <a:rPr lang="hu-HU" dirty="0"/>
+              <a:t>Adatmenedzsment</a:t>
+            </a:r>
+          </a:p>
+          <a:p>
+            <a:r>
+              <a:rPr lang="hu-HU" dirty="0"/>
+              <a:t>Üzenetküldés</a:t>
+            </a:r>
+          </a:p>
+          <a:p>
+            <a:r>
+              <a:rPr lang="hu-HU" dirty="0"/>
+              <a:t>Média szolgáltatások</a:t>
+            </a:r>
+          </a:p>
+          <a:p>
+            <a:r>
+              <a:rPr lang="hu-HU" dirty="0"/>
+              <a:t>CDN</a:t>
+            </a:r>
+          </a:p>
+          <a:p>
+            <a:r>
+              <a:rPr lang="hu-HU" dirty="0"/>
+              <a:t>Fejlesztői eszközök</a:t>
+            </a:r>
+          </a:p>
+          <a:p>
+            <a:r>
+              <a:rPr lang="hu-HU" dirty="0"/>
+              <a:t>Menedzsment</a:t>
+            </a:r>
+          </a:p>
+          <a:p>
+            <a:r>
+              <a:rPr lang="hu-HU" dirty="0"/>
+              <a:t>Gépi tanulás</a:t>
+            </a:r>
+          </a:p>
+        </p:txBody>
+      </p:sp>
+    </p:spTree>
+    <p:extLst>
+      <p:ext uri="{BB962C8B-B14F-4D97-AF65-F5344CB8AC3E}">
+        <p14:creationId xmlns:p14="http://schemas.microsoft.com/office/powerpoint/2010/main" val="1629465574"/>
+      </p:ext>
+    </p:extLst>
+  </p:cSld>
+  <p:clrMapOvr>
+    <a:masterClrMapping/>
+  </p:clrMapOvr>
+</p:sld>
+</file>
+
+<file path=ppt/slides/slide28.xml><?xml version="1.0" encoding="utf-8"?>
 <p:sld xmlns:a="http://schemas.openxmlformats.org/drawingml/2006/main" xmlns:r="http://schemas.openxmlformats.org/officeDocument/2006/relationships" xmlns:p="http://schemas.openxmlformats.org/presentationml/2006/main">
   <p:cSld>
     <p:spTree>

</xml_diff>